<commit_message>
finish report and ppt
</commit_message>
<xml_diff>
--- a/pre/mid/5.9_mid_report.pptx
+++ b/pre/mid/5.9_mid_report.pptx
@@ -5,7 +5,7 @@
     <p:sldMasterId id="2147483648" r:id="rId1"/>
   </p:sldMasterIdLst>
   <p:notesMasterIdLst>
-    <p:notesMasterId r:id="rId27"/>
+    <p:notesMasterId r:id="rId29"/>
   </p:notesMasterIdLst>
   <p:sldIdLst>
     <p:sldId id="256" r:id="rId2"/>
@@ -31,8 +31,10 @@
     <p:sldId id="285" r:id="rId22"/>
     <p:sldId id="286" r:id="rId23"/>
     <p:sldId id="287" r:id="rId24"/>
-    <p:sldId id="288" r:id="rId25"/>
+    <p:sldId id="291" r:id="rId25"/>
     <p:sldId id="289" r:id="rId26"/>
+    <p:sldId id="290" r:id="rId27"/>
+    <p:sldId id="288" r:id="rId28"/>
   </p:sldIdLst>
   <p:sldSz cx="12192000" cy="6858000"/>
   <p:notesSz cx="6858000" cy="9144000"/>
@@ -159,8 +161,10 @@
             <p14:sldId id="285"/>
             <p14:sldId id="286"/>
             <p14:sldId id="287"/>
+            <p14:sldId id="291"/>
+            <p14:sldId id="289"/>
+            <p14:sldId id="290"/>
             <p14:sldId id="288"/>
-            <p14:sldId id="289"/>
           </p14:sldIdLst>
         </p14:section>
         <p14:section name="resource" id="{6474D955-B10D-4AD0-84E1-E948BF589C32}">
@@ -11649,7 +11653,7 @@
                 <a:latin typeface="Arial" panose="020B0604020202020204" pitchFamily="34" charset="0"/>
                 <a:cs typeface="Arial" panose="020B0604020202020204" pitchFamily="34" charset="0"/>
               </a:rPr>
-              <a:t>Future Work</a:t>
+              <a:t>Experiment Result</a:t>
             </a:r>
             <a:endParaRPr lang="zh-CN" altLang="en-US" sz="5000" dirty="0">
               <a:latin typeface="Arial" panose="020B0604020202020204" pitchFamily="34" charset="0"/>
@@ -11690,10 +11694,10 @@
       </p:grpSpPr>
       <p:sp>
         <p:nvSpPr>
-          <p:cNvPr id="4" name="标题 1">
-            <a:extLst>
-              <a:ext uri="{FF2B5EF4-FFF2-40B4-BE49-F238E27FC236}">
-                <a16:creationId xmlns:a16="http://schemas.microsoft.com/office/drawing/2014/main" id="{F741896C-AF7B-49B6-A35A-62086F7FE141}"/>
+          <p:cNvPr id="2" name="标题 1">
+            <a:extLst>
+              <a:ext uri="{FF2B5EF4-FFF2-40B4-BE49-F238E27FC236}">
+                <a16:creationId xmlns:a16="http://schemas.microsoft.com/office/drawing/2014/main" id="{8BC5707B-FF34-4A89-AA2A-C5BC30B7FF05}"/>
               </a:ext>
             </a:extLst>
           </p:cNvPr>
@@ -11711,9 +11715,7 @@
           </a:xfrm>
         </p:spPr>
         <p:txBody>
-          <a:bodyPr>
-            <a:noAutofit/>
-          </a:bodyPr>
+          <a:bodyPr/>
           <a:lstStyle/>
           <a:p>
             <a:r>
@@ -11721,17 +11723,21 @@
                 <a:latin typeface="Arial" panose="020B0604020202020204" pitchFamily="34" charset="0"/>
                 <a:cs typeface="Arial" panose="020B0604020202020204" pitchFamily="34" charset="0"/>
               </a:rPr>
-              <a:t>Future Work</a:t>
-            </a:r>
+              <a:t>Experiment Specification</a:t>
+            </a:r>
+            <a:endParaRPr lang="zh-CN" altLang="en-US" dirty="0">
+              <a:latin typeface="Arial" panose="020B0604020202020204" pitchFamily="34" charset="0"/>
+              <a:cs typeface="Arial" panose="020B0604020202020204" pitchFamily="34" charset="0"/>
+            </a:endParaRPr>
           </a:p>
         </p:txBody>
       </p:sp>
       <p:sp>
         <p:nvSpPr>
-          <p:cNvPr id="5" name="文本框 4">
-            <a:extLst>
-              <a:ext uri="{FF2B5EF4-FFF2-40B4-BE49-F238E27FC236}">
-                <a16:creationId xmlns:a16="http://schemas.microsoft.com/office/drawing/2014/main" id="{2A5FCBCF-0ACA-4DE7-A8EE-FDD1509D05DC}"/>
+          <p:cNvPr id="11" name="文本框 10">
+            <a:extLst>
+              <a:ext uri="{FF2B5EF4-FFF2-40B4-BE49-F238E27FC236}">
+                <a16:creationId xmlns:a16="http://schemas.microsoft.com/office/drawing/2014/main" id="{94DC0C1D-7697-4DE1-A405-1CE7D5926F12}"/>
               </a:ext>
             </a:extLst>
           </p:cNvPr>
@@ -11740,8 +11746,8 @@
         </p:nvSpPr>
         <p:spPr>
           <a:xfrm>
-            <a:off x="931178" y="2457974"/>
-            <a:ext cx="9009776" cy="2785378"/>
+            <a:off x="838199" y="1689624"/>
+            <a:ext cx="10228385" cy="3785652"/>
           </a:xfrm>
           <a:prstGeom prst="rect">
             <a:avLst/>
@@ -11754,80 +11760,99 @@
           </a:bodyPr>
           <a:lstStyle/>
           <a:p>
-            <a:pPr marL="342900" indent="-342900">
-              <a:buAutoNum type="arabicPeriod"/>
-            </a:pPr>
-            <a:r>
-              <a:rPr lang="en-US" altLang="zh-CN" sz="2500" dirty="0">
+            <a:r>
+              <a:rPr lang="en-US" altLang="zh-CN" sz="2400" dirty="0">
                 <a:latin typeface="Arial" panose="020B0604020202020204" pitchFamily="34" charset="0"/>
                 <a:cs typeface="Arial" panose="020B0604020202020204" pitchFamily="34" charset="0"/>
               </a:rPr>
-              <a:t>Weight Sharing of Neural Networks</a:t>
-            </a:r>
-          </a:p>
-          <a:p>
-            <a:pPr marL="342900" indent="-342900">
-              <a:buAutoNum type="arabicPeriod"/>
-            </a:pPr>
-            <a:endParaRPr lang="en-US" altLang="zh-CN" sz="2500" dirty="0">
+              <a:t>Dataset: CIFAR10</a:t>
+            </a:r>
+          </a:p>
+          <a:p>
+            <a:r>
+              <a:rPr lang="en-US" altLang="zh-CN" sz="2400" dirty="0">
+                <a:latin typeface="Arial" panose="020B0604020202020204" pitchFamily="34" charset="0"/>
+                <a:cs typeface="Arial" panose="020B0604020202020204" pitchFamily="34" charset="0"/>
+              </a:rPr>
+              <a:t>Population size: 10</a:t>
+            </a:r>
+          </a:p>
+          <a:p>
+            <a:r>
+              <a:rPr lang="en-US" altLang="zh-CN" sz="2400">
+                <a:latin typeface="Arial" panose="020B0604020202020204" pitchFamily="34" charset="0"/>
+                <a:cs typeface="Arial" panose="020B0604020202020204" pitchFamily="34" charset="0"/>
+              </a:rPr>
+              <a:t>Default lifetime: 10</a:t>
+            </a:r>
+            <a:endParaRPr lang="en-US" altLang="zh-CN" sz="2400" dirty="0">
               <a:latin typeface="Arial" panose="020B0604020202020204" pitchFamily="34" charset="0"/>
               <a:cs typeface="Arial" panose="020B0604020202020204" pitchFamily="34" charset="0"/>
             </a:endParaRPr>
           </a:p>
           <a:p>
-            <a:pPr marL="342900" indent="-342900">
-              <a:buAutoNum type="arabicPeriod"/>
-            </a:pPr>
-            <a:r>
-              <a:rPr lang="en-US" altLang="zh-CN" sz="2500" dirty="0">
+            <a:r>
+              <a:rPr lang="en-US" altLang="zh-CN" sz="2400" dirty="0">
                 <a:latin typeface="Arial" panose="020B0604020202020204" pitchFamily="34" charset="0"/>
                 <a:cs typeface="Arial" panose="020B0604020202020204" pitchFamily="34" charset="0"/>
               </a:rPr>
-              <a:t> Heuristic Mutation Operation</a:t>
-            </a:r>
-          </a:p>
-          <a:p>
-            <a:pPr marL="342900" indent="-342900">
-              <a:buAutoNum type="arabicPeriod"/>
-            </a:pPr>
-            <a:endParaRPr lang="en-US" altLang="zh-CN" sz="2500" dirty="0">
-              <a:latin typeface="Arial" panose="020B0604020202020204" pitchFamily="34" charset="0"/>
-              <a:cs typeface="Arial" panose="020B0604020202020204" pitchFamily="34" charset="0"/>
-            </a:endParaRPr>
-          </a:p>
-          <a:p>
-            <a:pPr marL="342900" indent="-342900">
-              <a:buAutoNum type="arabicPeriod"/>
-            </a:pPr>
-            <a:r>
-              <a:rPr lang="en-US" altLang="zh-CN" sz="2500" dirty="0">
+              <a:t>Sample size: 5</a:t>
+            </a:r>
+          </a:p>
+          <a:p>
+            <a:r>
+              <a:rPr lang="en-US" altLang="zh-CN" sz="2400" dirty="0">
                 <a:latin typeface="Arial" panose="020B0604020202020204" pitchFamily="34" charset="0"/>
                 <a:cs typeface="Arial" panose="020B0604020202020204" pitchFamily="34" charset="0"/>
               </a:rPr>
-              <a:t>More Efficient Performance Estimation</a:t>
-            </a:r>
-          </a:p>
-          <a:p>
-            <a:pPr marL="342900" indent="-342900">
-              <a:buAutoNum type="arabicPeriod"/>
-            </a:pPr>
-            <a:endParaRPr lang="en-US" altLang="zh-CN" sz="2500" dirty="0">
-              <a:latin typeface="Arial" panose="020B0604020202020204" pitchFamily="34" charset="0"/>
-              <a:cs typeface="Arial" panose="020B0604020202020204" pitchFamily="34" charset="0"/>
-            </a:endParaRPr>
-          </a:p>
-          <a:p>
-            <a:pPr marL="342900" indent="-342900">
-              <a:buAutoNum type="arabicPeriod"/>
-            </a:pPr>
-            <a:r>
-              <a:rPr lang="en-US" altLang="zh-CN" sz="2500" dirty="0">
+              <a:t>Total Generations: 30</a:t>
+            </a:r>
+          </a:p>
+          <a:p>
+            <a:r>
+              <a:rPr lang="en-US" altLang="zh-CN" sz="2400" dirty="0">
                 <a:latin typeface="Arial" panose="020B0604020202020204" pitchFamily="34" charset="0"/>
                 <a:cs typeface="Arial" panose="020B0604020202020204" pitchFamily="34" charset="0"/>
               </a:rPr>
-              <a:t> Find Proper Size of a Cell</a:t>
-            </a:r>
-            <a:endParaRPr lang="zh-CN" altLang="en-US" sz="2500" dirty="0">
+              <a:t>Batch size: 100</a:t>
+            </a:r>
+          </a:p>
+          <a:p>
+            <a:r>
+              <a:rPr lang="en-US" altLang="zh-CN" sz="2400" dirty="0">
+                <a:latin typeface="Arial" panose="020B0604020202020204" pitchFamily="34" charset="0"/>
+                <a:cs typeface="Arial" panose="020B0604020202020204" pitchFamily="34" charset="0"/>
+              </a:rPr>
+              <a:t>Learning Rate: 0.001</a:t>
+            </a:r>
+          </a:p>
+          <a:p>
+            <a:r>
+              <a:rPr lang="en-US" altLang="zh-CN" sz="2400" dirty="0">
+                <a:latin typeface="Arial" panose="020B0604020202020204" pitchFamily="34" charset="0"/>
+                <a:cs typeface="Arial" panose="020B0604020202020204" pitchFamily="34" charset="0"/>
+              </a:rPr>
+              <a:t>Epoch: 20</a:t>
+            </a:r>
+          </a:p>
+          <a:p>
+            <a:r>
+              <a:rPr lang="en-US" altLang="zh-CN" sz="2400" dirty="0">
+                <a:latin typeface="Arial" panose="020B0604020202020204" pitchFamily="34" charset="0"/>
+                <a:cs typeface="Arial" panose="020B0604020202020204" pitchFamily="34" charset="0"/>
+              </a:rPr>
+              <a:t>Stack depth: 2</a:t>
+            </a:r>
+          </a:p>
+          <a:p>
+            <a:r>
+              <a:rPr lang="en-US" altLang="zh-CN" sz="2400" dirty="0">
+                <a:latin typeface="Arial" panose="020B0604020202020204" pitchFamily="34" charset="0"/>
+                <a:cs typeface="Arial" panose="020B0604020202020204" pitchFamily="34" charset="0"/>
+              </a:rPr>
+              <a:t>Number of channels: 32 for stack1, 64 for stack2 and 128 for stack3</a:t>
+            </a:r>
+            <a:endParaRPr lang="zh-CN" altLang="en-US" sz="2400" dirty="0">
               <a:latin typeface="Arial" panose="020B0604020202020204" pitchFamily="34" charset="0"/>
               <a:cs typeface="Arial" panose="020B0604020202020204" pitchFamily="34" charset="0"/>
             </a:endParaRPr>
@@ -11837,7 +11862,7 @@
     </p:spTree>
     <p:extLst>
       <p:ext uri="{BB962C8B-B14F-4D97-AF65-F5344CB8AC3E}">
-        <p14:creationId xmlns:p14="http://schemas.microsoft.com/office/powerpoint/2010/main" val="3516523388"/>
+        <p14:creationId xmlns:p14="http://schemas.microsoft.com/office/powerpoint/2010/main" val="2044632277"/>
       </p:ext>
     </p:extLst>
   </p:cSld>
@@ -11906,1497 +11931,6 @@
       </p:sp>
       <p:sp>
         <p:nvSpPr>
-          <p:cNvPr id="4" name="矩形 3">
-            <a:extLst>
-              <a:ext uri="{FF2B5EF4-FFF2-40B4-BE49-F238E27FC236}">
-                <a16:creationId xmlns:a16="http://schemas.microsoft.com/office/drawing/2014/main" id="{27446143-D64E-4809-AD2A-D3643A939526}"/>
-              </a:ext>
-            </a:extLst>
-          </p:cNvPr>
-          <p:cNvSpPr/>
-          <p:nvPr/>
-        </p:nvSpPr>
-        <p:spPr>
-          <a:xfrm>
-            <a:off x="10588592" y="928688"/>
-            <a:ext cx="678180" cy="388620"/>
-          </a:xfrm>
-          <a:prstGeom prst="rect">
-            <a:avLst/>
-          </a:prstGeom>
-          <a:noFill/>
-          <a:ln w="38100"/>
-        </p:spPr>
-        <p:style>
-          <a:lnRef idx="2">
-            <a:schemeClr val="dk1">
-              <a:shade val="50000"/>
-            </a:schemeClr>
-          </a:lnRef>
-          <a:fillRef idx="1">
-            <a:schemeClr val="dk1"/>
-          </a:fillRef>
-          <a:effectRef idx="0">
-            <a:schemeClr val="dk1"/>
-          </a:effectRef>
-          <a:fontRef idx="minor">
-            <a:schemeClr val="lt1"/>
-          </a:fontRef>
-        </p:style>
-        <p:txBody>
-          <a:bodyPr rtlCol="0" anchor="ctr"/>
-          <a:lstStyle/>
-          <a:p>
-            <a:pPr algn="ctr"/>
-            <a:r>
-              <a:rPr lang="en-US" altLang="zh-CN" b="1" dirty="0">
-                <a:solidFill>
-                  <a:schemeClr val="tx1"/>
-                </a:solidFill>
-                <a:latin typeface="Arial" panose="020B0604020202020204" pitchFamily="34" charset="0"/>
-                <a:cs typeface="Arial" panose="020B0604020202020204" pitchFamily="34" charset="0"/>
-              </a:rPr>
-              <a:t>1</a:t>
-            </a:r>
-            <a:endParaRPr lang="zh-CN" altLang="en-US" b="1" dirty="0">
-              <a:solidFill>
-                <a:schemeClr val="tx1"/>
-              </a:solidFill>
-              <a:latin typeface="Arial" panose="020B0604020202020204" pitchFamily="34" charset="0"/>
-              <a:cs typeface="Arial" panose="020B0604020202020204" pitchFamily="34" charset="0"/>
-            </a:endParaRPr>
-          </a:p>
-        </p:txBody>
-      </p:sp>
-      <p:sp>
-        <p:nvSpPr>
-          <p:cNvPr id="5" name="矩形 4">
-            <a:extLst>
-              <a:ext uri="{FF2B5EF4-FFF2-40B4-BE49-F238E27FC236}">
-                <a16:creationId xmlns:a16="http://schemas.microsoft.com/office/drawing/2014/main" id="{8CDC6B79-6F9B-4E98-A76D-4E9603D32442}"/>
-              </a:ext>
-            </a:extLst>
-          </p:cNvPr>
-          <p:cNvSpPr/>
-          <p:nvPr/>
-        </p:nvSpPr>
-        <p:spPr>
-          <a:xfrm>
-            <a:off x="9084945" y="928688"/>
-            <a:ext cx="678180" cy="388620"/>
-          </a:xfrm>
-          <a:prstGeom prst="rect">
-            <a:avLst/>
-          </a:prstGeom>
-          <a:noFill/>
-          <a:ln w="38100"/>
-        </p:spPr>
-        <p:style>
-          <a:lnRef idx="2">
-            <a:schemeClr val="dk1">
-              <a:shade val="50000"/>
-            </a:schemeClr>
-          </a:lnRef>
-          <a:fillRef idx="1">
-            <a:schemeClr val="dk1"/>
-          </a:fillRef>
-          <a:effectRef idx="0">
-            <a:schemeClr val="dk1"/>
-          </a:effectRef>
-          <a:fontRef idx="minor">
-            <a:schemeClr val="lt1"/>
-          </a:fontRef>
-        </p:style>
-        <p:txBody>
-          <a:bodyPr rtlCol="0" anchor="ctr"/>
-          <a:lstStyle/>
-          <a:p>
-            <a:pPr algn="ctr"/>
-            <a:r>
-              <a:rPr lang="en-US" altLang="zh-CN" b="1" dirty="0">
-                <a:solidFill>
-                  <a:schemeClr val="tx1"/>
-                </a:solidFill>
-                <a:latin typeface="Arial" panose="020B0604020202020204" pitchFamily="34" charset="0"/>
-                <a:cs typeface="Arial" panose="020B0604020202020204" pitchFamily="34" charset="0"/>
-              </a:rPr>
-              <a:t>0</a:t>
-            </a:r>
-            <a:endParaRPr lang="zh-CN" altLang="en-US" b="1" dirty="0">
-              <a:solidFill>
-                <a:schemeClr val="tx1"/>
-              </a:solidFill>
-              <a:latin typeface="Arial" panose="020B0604020202020204" pitchFamily="34" charset="0"/>
-              <a:cs typeface="Arial" panose="020B0604020202020204" pitchFamily="34" charset="0"/>
-            </a:endParaRPr>
-          </a:p>
-        </p:txBody>
-      </p:sp>
-      <p:sp>
-        <p:nvSpPr>
-          <p:cNvPr id="6" name="矩形 5">
-            <a:extLst>
-              <a:ext uri="{FF2B5EF4-FFF2-40B4-BE49-F238E27FC236}">
-                <a16:creationId xmlns:a16="http://schemas.microsoft.com/office/drawing/2014/main" id="{B25ED3E5-1E62-4577-B1A9-DFE39D6DC3C1}"/>
-              </a:ext>
-            </a:extLst>
-          </p:cNvPr>
-          <p:cNvSpPr/>
-          <p:nvPr/>
-        </p:nvSpPr>
-        <p:spPr>
-          <a:xfrm>
-            <a:off x="9082234" y="2611456"/>
-            <a:ext cx="678180" cy="388620"/>
-          </a:xfrm>
-          <a:prstGeom prst="rect">
-            <a:avLst/>
-          </a:prstGeom>
-          <a:noFill/>
-          <a:ln w="38100"/>
-        </p:spPr>
-        <p:style>
-          <a:lnRef idx="2">
-            <a:schemeClr val="dk1">
-              <a:shade val="50000"/>
-            </a:schemeClr>
-          </a:lnRef>
-          <a:fillRef idx="1">
-            <a:schemeClr val="dk1"/>
-          </a:fillRef>
-          <a:effectRef idx="0">
-            <a:schemeClr val="dk1"/>
-          </a:effectRef>
-          <a:fontRef idx="minor">
-            <a:schemeClr val="lt1"/>
-          </a:fontRef>
-        </p:style>
-        <p:txBody>
-          <a:bodyPr rtlCol="0" anchor="ctr"/>
-          <a:lstStyle/>
-          <a:p>
-            <a:pPr algn="ctr"/>
-            <a:r>
-              <a:rPr lang="en-US" altLang="zh-CN" b="1" dirty="0">
-                <a:solidFill>
-                  <a:schemeClr val="tx1"/>
-                </a:solidFill>
-                <a:latin typeface="Arial" panose="020B0604020202020204" pitchFamily="34" charset="0"/>
-                <a:cs typeface="Arial" panose="020B0604020202020204" pitchFamily="34" charset="0"/>
-              </a:rPr>
-              <a:t>2</a:t>
-            </a:r>
-            <a:endParaRPr lang="zh-CN" altLang="en-US" b="1" dirty="0">
-              <a:solidFill>
-                <a:schemeClr val="tx1"/>
-              </a:solidFill>
-              <a:latin typeface="Arial" panose="020B0604020202020204" pitchFamily="34" charset="0"/>
-              <a:cs typeface="Arial" panose="020B0604020202020204" pitchFamily="34" charset="0"/>
-            </a:endParaRPr>
-          </a:p>
-        </p:txBody>
-      </p:sp>
-      <p:sp>
-        <p:nvSpPr>
-          <p:cNvPr id="7" name="矩形 6">
-            <a:extLst>
-              <a:ext uri="{FF2B5EF4-FFF2-40B4-BE49-F238E27FC236}">
-                <a16:creationId xmlns:a16="http://schemas.microsoft.com/office/drawing/2014/main" id="{20DA319B-EB45-4064-B4CA-7C7CBE2DDC14}"/>
-              </a:ext>
-            </a:extLst>
-          </p:cNvPr>
-          <p:cNvSpPr/>
-          <p:nvPr/>
-        </p:nvSpPr>
-        <p:spPr>
-          <a:xfrm>
-            <a:off x="8567546" y="3600874"/>
-            <a:ext cx="678180" cy="388620"/>
-          </a:xfrm>
-          <a:prstGeom prst="rect">
-            <a:avLst/>
-          </a:prstGeom>
-          <a:noFill/>
-          <a:ln w="38100"/>
-        </p:spPr>
-        <p:style>
-          <a:lnRef idx="2">
-            <a:schemeClr val="dk1">
-              <a:shade val="50000"/>
-            </a:schemeClr>
-          </a:lnRef>
-          <a:fillRef idx="1">
-            <a:schemeClr val="dk1"/>
-          </a:fillRef>
-          <a:effectRef idx="0">
-            <a:schemeClr val="dk1"/>
-          </a:effectRef>
-          <a:fontRef idx="minor">
-            <a:schemeClr val="lt1"/>
-          </a:fontRef>
-        </p:style>
-        <p:txBody>
-          <a:bodyPr rtlCol="0" anchor="ctr"/>
-          <a:lstStyle/>
-          <a:p>
-            <a:pPr algn="ctr"/>
-            <a:r>
-              <a:rPr lang="en-US" altLang="zh-CN" b="1" dirty="0">
-                <a:solidFill>
-                  <a:schemeClr val="tx1"/>
-                </a:solidFill>
-                <a:latin typeface="Arial" panose="020B0604020202020204" pitchFamily="34" charset="0"/>
-                <a:cs typeface="Arial" panose="020B0604020202020204" pitchFamily="34" charset="0"/>
-              </a:rPr>
-              <a:t>3</a:t>
-            </a:r>
-            <a:endParaRPr lang="zh-CN" altLang="en-US" b="1" dirty="0">
-              <a:solidFill>
-                <a:schemeClr val="tx1"/>
-              </a:solidFill>
-              <a:latin typeface="Arial" panose="020B0604020202020204" pitchFamily="34" charset="0"/>
-              <a:cs typeface="Arial" panose="020B0604020202020204" pitchFamily="34" charset="0"/>
-            </a:endParaRPr>
-          </a:p>
-        </p:txBody>
-      </p:sp>
-      <p:sp>
-        <p:nvSpPr>
-          <p:cNvPr id="8" name="矩形 7">
-            <a:extLst>
-              <a:ext uri="{FF2B5EF4-FFF2-40B4-BE49-F238E27FC236}">
-                <a16:creationId xmlns:a16="http://schemas.microsoft.com/office/drawing/2014/main" id="{89E30F83-6C30-4892-84D9-EA39963312F7}"/>
-              </a:ext>
-            </a:extLst>
-          </p:cNvPr>
-          <p:cNvSpPr/>
-          <p:nvPr/>
-        </p:nvSpPr>
-        <p:spPr>
-          <a:xfrm>
-            <a:off x="8547985" y="4795272"/>
-            <a:ext cx="678180" cy="388620"/>
-          </a:xfrm>
-          <a:prstGeom prst="rect">
-            <a:avLst/>
-          </a:prstGeom>
-          <a:noFill/>
-          <a:ln w="38100"/>
-        </p:spPr>
-        <p:style>
-          <a:lnRef idx="2">
-            <a:schemeClr val="dk1">
-              <a:shade val="50000"/>
-            </a:schemeClr>
-          </a:lnRef>
-          <a:fillRef idx="1">
-            <a:schemeClr val="dk1"/>
-          </a:fillRef>
-          <a:effectRef idx="0">
-            <a:schemeClr val="dk1"/>
-          </a:effectRef>
-          <a:fontRef idx="minor">
-            <a:schemeClr val="lt1"/>
-          </a:fontRef>
-        </p:style>
-        <p:txBody>
-          <a:bodyPr rtlCol="0" anchor="ctr"/>
-          <a:lstStyle/>
-          <a:p>
-            <a:pPr algn="ctr"/>
-            <a:r>
-              <a:rPr lang="en-US" altLang="zh-CN" b="1" dirty="0">
-                <a:solidFill>
-                  <a:schemeClr val="tx1"/>
-                </a:solidFill>
-                <a:latin typeface="Arial" panose="020B0604020202020204" pitchFamily="34" charset="0"/>
-                <a:cs typeface="Arial" panose="020B0604020202020204" pitchFamily="34" charset="0"/>
-              </a:rPr>
-              <a:t>4</a:t>
-            </a:r>
-            <a:endParaRPr lang="zh-CN" altLang="en-US" b="1" dirty="0">
-              <a:solidFill>
-                <a:schemeClr val="tx1"/>
-              </a:solidFill>
-              <a:latin typeface="Arial" panose="020B0604020202020204" pitchFamily="34" charset="0"/>
-              <a:cs typeface="Arial" panose="020B0604020202020204" pitchFamily="34" charset="0"/>
-            </a:endParaRPr>
-          </a:p>
-        </p:txBody>
-      </p:sp>
-      <p:graphicFrame>
-        <p:nvGraphicFramePr>
-          <p:cNvPr id="9" name="表格 8">
-            <a:extLst>
-              <a:ext uri="{FF2B5EF4-FFF2-40B4-BE49-F238E27FC236}">
-                <a16:creationId xmlns:a16="http://schemas.microsoft.com/office/drawing/2014/main" id="{354147C7-8532-48F8-8B44-6CFF2F919243}"/>
-              </a:ext>
-            </a:extLst>
-          </p:cNvPr>
-          <p:cNvGraphicFramePr>
-            <a:graphicFrameLocks noGrp="1"/>
-          </p:cNvGraphicFramePr>
-          <p:nvPr>
-            <p:extLst>
-              <p:ext uri="{D42A27DB-BD31-4B8C-83A1-F6EECF244321}">
-                <p14:modId xmlns:p14="http://schemas.microsoft.com/office/powerpoint/2010/main" val="839242023"/>
-              </p:ext>
-            </p:extLst>
-          </p:nvPr>
-        </p:nvGraphicFramePr>
-        <p:xfrm>
-          <a:off x="5056949" y="1529934"/>
-          <a:ext cx="2854600" cy="2987040"/>
-        </p:xfrm>
-        <a:graphic>
-          <a:graphicData uri="http://schemas.openxmlformats.org/drawingml/2006/table">
-            <a:tbl>
-              <a:tblPr firstRow="1" bandRow="1">
-                <a:effectLst/>
-                <a:tableStyleId>{5C22544A-7EE6-4342-B048-85BDC9FD1C3A}</a:tableStyleId>
-              </a:tblPr>
-              <a:tblGrid>
-                <a:gridCol w="1427300">
-                  <a:extLst>
-                    <a:ext uri="{9D8B030D-6E8A-4147-A177-3AD203B41FA5}">
-                      <a16:colId xmlns:a16="http://schemas.microsoft.com/office/drawing/2014/main" val="2401383242"/>
-                    </a:ext>
-                  </a:extLst>
-                </a:gridCol>
-                <a:gridCol w="1427300">
-                  <a:extLst>
-                    <a:ext uri="{9D8B030D-6E8A-4147-A177-3AD203B41FA5}">
-                      <a16:colId xmlns:a16="http://schemas.microsoft.com/office/drawing/2014/main" val="950134537"/>
-                    </a:ext>
-                  </a:extLst>
-                </a:gridCol>
-              </a:tblGrid>
-              <a:tr h="350521">
-                <a:tc>
-                  <a:txBody>
-                    <a:bodyPr/>
-                    <a:lstStyle/>
-                    <a:p>
-                      <a:pPr algn="ctr"/>
-                      <a:endParaRPr lang="zh-CN" altLang="en-US" sz="2200" b="1" dirty="0">
-                        <a:latin typeface="Times New Roman" panose="02020603050405020304" pitchFamily="18" charset="0"/>
-                        <a:cs typeface="Times New Roman" panose="02020603050405020304" pitchFamily="18" charset="0"/>
-                      </a:endParaRPr>
-                    </a:p>
-                  </a:txBody>
-                  <a:tcPr>
-                    <a:lnL w="12700" cap="flat" cmpd="sng" algn="ctr">
-                      <a:noFill/>
-                      <a:prstDash val="solid"/>
-                      <a:round/>
-                      <a:headEnd type="none" w="med" len="med"/>
-                      <a:tailEnd type="none" w="med" len="med"/>
-                    </a:lnL>
-                    <a:lnR w="12700" cap="flat" cmpd="sng" algn="ctr">
-                      <a:noFill/>
-                      <a:prstDash val="solid"/>
-                      <a:round/>
-                      <a:headEnd type="none" w="med" len="med"/>
-                      <a:tailEnd type="none" w="med" len="med"/>
-                    </a:lnR>
-                    <a:lnT w="12700" cap="flat" cmpd="sng" algn="ctr">
-                      <a:noFill/>
-                      <a:prstDash val="solid"/>
-                      <a:round/>
-                      <a:headEnd type="none" w="med" len="med"/>
-                      <a:tailEnd type="none" w="med" len="med"/>
-                    </a:lnT>
-                    <a:lnB w="12700" cap="flat" cmpd="sng" algn="ctr">
-                      <a:noFill/>
-                      <a:prstDash val="solid"/>
-                      <a:round/>
-                      <a:headEnd type="none" w="med" len="med"/>
-                      <a:tailEnd type="none" w="med" len="med"/>
-                    </a:lnB>
-                    <a:lnTlToBr w="12700" cmpd="sng">
-                      <a:noFill/>
-                      <a:prstDash val="solid"/>
-                    </a:lnTlToBr>
-                    <a:lnBlToTr w="12700" cmpd="sng">
-                      <a:noFill/>
-                      <a:prstDash val="solid"/>
-                    </a:lnBlToTr>
-                    <a:noFill/>
-                  </a:tcPr>
-                </a:tc>
-                <a:tc>
-                  <a:txBody>
-                    <a:bodyPr/>
-                    <a:lstStyle/>
-                    <a:p>
-                      <a:pPr algn="ctr"/>
-                      <a:r>
-                        <a:rPr lang="en-US" altLang="zh-CN" sz="2200" b="1" dirty="0">
-                          <a:solidFill>
-                            <a:schemeClr val="tx1"/>
-                          </a:solidFill>
-                          <a:latin typeface="Times New Roman" panose="02020603050405020304" pitchFamily="18" charset="0"/>
-                          <a:cs typeface="Times New Roman" panose="02020603050405020304" pitchFamily="18" charset="0"/>
-                        </a:rPr>
-                        <a:t>Operation</a:t>
-                      </a:r>
-                      <a:endParaRPr lang="zh-CN" altLang="en-US" sz="2200" b="1" dirty="0">
-                        <a:solidFill>
-                          <a:schemeClr val="tx1"/>
-                        </a:solidFill>
-                        <a:latin typeface="Times New Roman" panose="02020603050405020304" pitchFamily="18" charset="0"/>
-                        <a:cs typeface="Times New Roman" panose="02020603050405020304" pitchFamily="18" charset="0"/>
-                      </a:endParaRPr>
-                    </a:p>
-                  </a:txBody>
-                  <a:tcPr>
-                    <a:lnL w="12700" cap="flat" cmpd="sng" algn="ctr">
-                      <a:noFill/>
-                      <a:prstDash val="solid"/>
-                      <a:round/>
-                      <a:headEnd type="none" w="med" len="med"/>
-                      <a:tailEnd type="none" w="med" len="med"/>
-                    </a:lnL>
-                    <a:lnR w="12700" cap="flat" cmpd="sng" algn="ctr">
-                      <a:noFill/>
-                      <a:prstDash val="solid"/>
-                      <a:round/>
-                      <a:headEnd type="none" w="med" len="med"/>
-                      <a:tailEnd type="none" w="med" len="med"/>
-                    </a:lnR>
-                    <a:lnT w="12700" cap="flat" cmpd="sng" algn="ctr">
-                      <a:noFill/>
-                      <a:prstDash val="solid"/>
-                      <a:round/>
-                      <a:headEnd type="none" w="med" len="med"/>
-                      <a:tailEnd type="none" w="med" len="med"/>
-                    </a:lnT>
-                    <a:lnB w="12700" cap="flat" cmpd="sng" algn="ctr">
-                      <a:noFill/>
-                      <a:prstDash val="solid"/>
-                      <a:round/>
-                      <a:headEnd type="none" w="med" len="med"/>
-                      <a:tailEnd type="none" w="med" len="med"/>
-                    </a:lnB>
-                    <a:lnTlToBr w="12700" cmpd="sng">
-                      <a:noFill/>
-                      <a:prstDash val="solid"/>
-                    </a:lnTlToBr>
-                    <a:lnBlToTr w="12700" cmpd="sng">
-                      <a:noFill/>
-                      <a:prstDash val="solid"/>
-                    </a:lnBlToTr>
-                    <a:noFill/>
-                  </a:tcPr>
-                </a:tc>
-                <a:extLst>
-                  <a:ext uri="{0D108BD9-81ED-4DB2-BD59-A6C34878D82A}">
-                    <a16:rowId xmlns:a16="http://schemas.microsoft.com/office/drawing/2014/main" val="3828241060"/>
-                  </a:ext>
-                </a:extLst>
-              </a:tr>
-              <a:tr h="370840">
-                <a:tc>
-                  <a:txBody>
-                    <a:bodyPr/>
-                    <a:lstStyle/>
-                    <a:p>
-                      <a:pPr algn="ctr"/>
-                      <a:r>
-                        <a:rPr lang="en-US" altLang="zh-CN" sz="2200" b="1" dirty="0">
-                          <a:latin typeface="Times New Roman" panose="02020603050405020304" pitchFamily="18" charset="0"/>
-                          <a:cs typeface="Times New Roman" panose="02020603050405020304" pitchFamily="18" charset="0"/>
-                        </a:rPr>
-                        <a:t>(0, 2)</a:t>
-                      </a:r>
-                      <a:endParaRPr lang="zh-CN" altLang="en-US" sz="2200" b="1" dirty="0">
-                        <a:latin typeface="Times New Roman" panose="02020603050405020304" pitchFamily="18" charset="0"/>
-                        <a:cs typeface="Times New Roman" panose="02020603050405020304" pitchFamily="18" charset="0"/>
-                      </a:endParaRPr>
-                    </a:p>
-                  </a:txBody>
-                  <a:tcPr>
-                    <a:lnL w="12700" cap="flat" cmpd="sng" algn="ctr">
-                      <a:noFill/>
-                      <a:prstDash val="solid"/>
-                      <a:round/>
-                      <a:headEnd type="none" w="med" len="med"/>
-                      <a:tailEnd type="none" w="med" len="med"/>
-                    </a:lnL>
-                    <a:lnR w="12700" cap="flat" cmpd="sng" algn="ctr">
-                      <a:noFill/>
-                      <a:prstDash val="solid"/>
-                      <a:round/>
-                      <a:headEnd type="none" w="med" len="med"/>
-                      <a:tailEnd type="none" w="med" len="med"/>
-                    </a:lnR>
-                    <a:lnT w="12700" cap="flat" cmpd="sng" algn="ctr">
-                      <a:noFill/>
-                      <a:prstDash val="solid"/>
-                      <a:round/>
-                      <a:headEnd type="none" w="med" len="med"/>
-                      <a:tailEnd type="none" w="med" len="med"/>
-                    </a:lnT>
-                    <a:lnB w="12700" cap="flat" cmpd="sng" algn="ctr">
-                      <a:noFill/>
-                      <a:prstDash val="solid"/>
-                      <a:round/>
-                      <a:headEnd type="none" w="med" len="med"/>
-                      <a:tailEnd type="none" w="med" len="med"/>
-                    </a:lnB>
-                    <a:lnTlToBr w="12700" cmpd="sng">
-                      <a:noFill/>
-                      <a:prstDash val="solid"/>
-                    </a:lnTlToBr>
-                    <a:lnBlToTr w="12700" cmpd="sng">
-                      <a:noFill/>
-                      <a:prstDash val="solid"/>
-                    </a:lnBlToTr>
-                    <a:noFill/>
-                  </a:tcPr>
-                </a:tc>
-                <a:tc>
-                  <a:txBody>
-                    <a:bodyPr/>
-                    <a:lstStyle/>
-                    <a:p>
-                      <a:pPr algn="ctr"/>
-                      <a:r>
-                        <a:rPr lang="en-US" altLang="zh-CN" sz="2200" b="1" dirty="0">
-                          <a:solidFill>
-                            <a:srgbClr val="7030A0"/>
-                          </a:solidFill>
-                          <a:latin typeface="Times New Roman" panose="02020603050405020304" pitchFamily="18" charset="0"/>
-                          <a:cs typeface="Times New Roman" panose="02020603050405020304" pitchFamily="18" charset="0"/>
-                        </a:rPr>
-                        <a:t>2</a:t>
-                      </a:r>
-                      <a:endParaRPr lang="zh-CN" altLang="en-US" sz="2200" b="1" dirty="0">
-                        <a:solidFill>
-                          <a:srgbClr val="7030A0"/>
-                        </a:solidFill>
-                        <a:latin typeface="Times New Roman" panose="02020603050405020304" pitchFamily="18" charset="0"/>
-                        <a:cs typeface="Times New Roman" panose="02020603050405020304" pitchFamily="18" charset="0"/>
-                      </a:endParaRPr>
-                    </a:p>
-                  </a:txBody>
-                  <a:tcPr>
-                    <a:lnL w="12700" cap="flat" cmpd="sng" algn="ctr">
-                      <a:noFill/>
-                      <a:prstDash val="solid"/>
-                      <a:round/>
-                      <a:headEnd type="none" w="med" len="med"/>
-                      <a:tailEnd type="none" w="med" len="med"/>
-                    </a:lnL>
-                    <a:lnR w="12700" cap="flat" cmpd="sng" algn="ctr">
-                      <a:noFill/>
-                      <a:prstDash val="solid"/>
-                      <a:round/>
-                      <a:headEnd type="none" w="med" len="med"/>
-                      <a:tailEnd type="none" w="med" len="med"/>
-                    </a:lnR>
-                    <a:lnT w="12700" cap="flat" cmpd="sng" algn="ctr">
-                      <a:noFill/>
-                      <a:prstDash val="solid"/>
-                      <a:round/>
-                      <a:headEnd type="none" w="med" len="med"/>
-                      <a:tailEnd type="none" w="med" len="med"/>
-                    </a:lnT>
-                    <a:lnB w="12700" cap="flat" cmpd="sng" algn="ctr">
-                      <a:noFill/>
-                      <a:prstDash val="solid"/>
-                      <a:round/>
-                      <a:headEnd type="none" w="med" len="med"/>
-                      <a:tailEnd type="none" w="med" len="med"/>
-                    </a:lnB>
-                    <a:lnTlToBr w="12700" cmpd="sng">
-                      <a:noFill/>
-                      <a:prstDash val="solid"/>
-                    </a:lnTlToBr>
-                    <a:lnBlToTr w="12700" cmpd="sng">
-                      <a:noFill/>
-                      <a:prstDash val="solid"/>
-                    </a:lnBlToTr>
-                    <a:noFill/>
-                  </a:tcPr>
-                </a:tc>
-                <a:extLst>
-                  <a:ext uri="{0D108BD9-81ED-4DB2-BD59-A6C34878D82A}">
-                    <a16:rowId xmlns:a16="http://schemas.microsoft.com/office/drawing/2014/main" val="2070731399"/>
-                  </a:ext>
-                </a:extLst>
-              </a:tr>
-              <a:tr h="370840">
-                <a:tc>
-                  <a:txBody>
-                    <a:bodyPr/>
-                    <a:lstStyle/>
-                    <a:p>
-                      <a:pPr algn="ctr"/>
-                      <a:r>
-                        <a:rPr lang="en-US" altLang="zh-CN" sz="2200" b="1" dirty="0">
-                          <a:latin typeface="Times New Roman" panose="02020603050405020304" pitchFamily="18" charset="0"/>
-                          <a:cs typeface="Times New Roman" panose="02020603050405020304" pitchFamily="18" charset="0"/>
-                        </a:rPr>
-                        <a:t>(2, 3)</a:t>
-                      </a:r>
-                      <a:endParaRPr lang="zh-CN" altLang="en-US" sz="2200" b="1" dirty="0">
-                        <a:latin typeface="Times New Roman" panose="02020603050405020304" pitchFamily="18" charset="0"/>
-                        <a:cs typeface="Times New Roman" panose="02020603050405020304" pitchFamily="18" charset="0"/>
-                      </a:endParaRPr>
-                    </a:p>
-                  </a:txBody>
-                  <a:tcPr>
-                    <a:lnL w="12700" cap="flat" cmpd="sng" algn="ctr">
-                      <a:noFill/>
-                      <a:prstDash val="solid"/>
-                      <a:round/>
-                      <a:headEnd type="none" w="med" len="med"/>
-                      <a:tailEnd type="none" w="med" len="med"/>
-                    </a:lnL>
-                    <a:lnR w="12700" cap="flat" cmpd="sng" algn="ctr">
-                      <a:noFill/>
-                      <a:prstDash val="solid"/>
-                      <a:round/>
-                      <a:headEnd type="none" w="med" len="med"/>
-                      <a:tailEnd type="none" w="med" len="med"/>
-                    </a:lnR>
-                    <a:lnT w="12700" cap="flat" cmpd="sng" algn="ctr">
-                      <a:noFill/>
-                      <a:prstDash val="solid"/>
-                      <a:round/>
-                      <a:headEnd type="none" w="med" len="med"/>
-                      <a:tailEnd type="none" w="med" len="med"/>
-                    </a:lnT>
-                    <a:lnB w="12700" cap="flat" cmpd="sng" algn="ctr">
-                      <a:noFill/>
-                      <a:prstDash val="solid"/>
-                      <a:round/>
-                      <a:headEnd type="none" w="med" len="med"/>
-                      <a:tailEnd type="none" w="med" len="med"/>
-                    </a:lnB>
-                    <a:lnTlToBr w="12700" cmpd="sng">
-                      <a:noFill/>
-                      <a:prstDash val="solid"/>
-                    </a:lnTlToBr>
-                    <a:lnBlToTr w="12700" cmpd="sng">
-                      <a:noFill/>
-                      <a:prstDash val="solid"/>
-                    </a:lnBlToTr>
-                    <a:noFill/>
-                  </a:tcPr>
-                </a:tc>
-                <a:tc>
-                  <a:txBody>
-                    <a:bodyPr/>
-                    <a:lstStyle/>
-                    <a:p>
-                      <a:pPr algn="ctr"/>
-                      <a:r>
-                        <a:rPr lang="en-US" altLang="zh-CN" sz="2200" b="1" dirty="0">
-                          <a:solidFill>
-                            <a:srgbClr val="0000CC"/>
-                          </a:solidFill>
-                          <a:latin typeface="Times New Roman" panose="02020603050405020304" pitchFamily="18" charset="0"/>
-                          <a:cs typeface="Times New Roman" panose="02020603050405020304" pitchFamily="18" charset="0"/>
-                        </a:rPr>
-                        <a:t>4</a:t>
-                      </a:r>
-                      <a:endParaRPr lang="zh-CN" altLang="en-US" sz="2200" b="1" dirty="0">
-                        <a:solidFill>
-                          <a:srgbClr val="0000CC"/>
-                        </a:solidFill>
-                        <a:latin typeface="Times New Roman" panose="02020603050405020304" pitchFamily="18" charset="0"/>
-                        <a:cs typeface="Times New Roman" panose="02020603050405020304" pitchFamily="18" charset="0"/>
-                      </a:endParaRPr>
-                    </a:p>
-                  </a:txBody>
-                  <a:tcPr>
-                    <a:lnL w="12700" cap="flat" cmpd="sng" algn="ctr">
-                      <a:noFill/>
-                      <a:prstDash val="solid"/>
-                      <a:round/>
-                      <a:headEnd type="none" w="med" len="med"/>
-                      <a:tailEnd type="none" w="med" len="med"/>
-                    </a:lnL>
-                    <a:lnR w="12700" cap="flat" cmpd="sng" algn="ctr">
-                      <a:noFill/>
-                      <a:prstDash val="solid"/>
-                      <a:round/>
-                      <a:headEnd type="none" w="med" len="med"/>
-                      <a:tailEnd type="none" w="med" len="med"/>
-                    </a:lnR>
-                    <a:lnT w="12700" cap="flat" cmpd="sng" algn="ctr">
-                      <a:noFill/>
-                      <a:prstDash val="solid"/>
-                      <a:round/>
-                      <a:headEnd type="none" w="med" len="med"/>
-                      <a:tailEnd type="none" w="med" len="med"/>
-                    </a:lnT>
-                    <a:lnB w="12700" cap="flat" cmpd="sng" algn="ctr">
-                      <a:noFill/>
-                      <a:prstDash val="solid"/>
-                      <a:round/>
-                      <a:headEnd type="none" w="med" len="med"/>
-                      <a:tailEnd type="none" w="med" len="med"/>
-                    </a:lnB>
-                    <a:lnTlToBr w="12700" cmpd="sng">
-                      <a:noFill/>
-                      <a:prstDash val="solid"/>
-                    </a:lnTlToBr>
-                    <a:lnBlToTr w="12700" cmpd="sng">
-                      <a:noFill/>
-                      <a:prstDash val="solid"/>
-                    </a:lnBlToTr>
-                    <a:noFill/>
-                  </a:tcPr>
-                </a:tc>
-                <a:extLst>
-                  <a:ext uri="{0D108BD9-81ED-4DB2-BD59-A6C34878D82A}">
-                    <a16:rowId xmlns:a16="http://schemas.microsoft.com/office/drawing/2014/main" val="1433526846"/>
-                  </a:ext>
-                </a:extLst>
-              </a:tr>
-              <a:tr h="370840">
-                <a:tc>
-                  <a:txBody>
-                    <a:bodyPr/>
-                    <a:lstStyle/>
-                    <a:p>
-                      <a:pPr algn="ctr"/>
-                      <a:r>
-                        <a:rPr lang="en-US" altLang="zh-CN" sz="2200" b="1" dirty="0">
-                          <a:latin typeface="Times New Roman" panose="02020603050405020304" pitchFamily="18" charset="0"/>
-                          <a:cs typeface="Times New Roman" panose="02020603050405020304" pitchFamily="18" charset="0"/>
-                        </a:rPr>
-                        <a:t>(3, 4)</a:t>
-                      </a:r>
-                      <a:endParaRPr lang="zh-CN" altLang="en-US" sz="2200" b="1" dirty="0">
-                        <a:latin typeface="Times New Roman" panose="02020603050405020304" pitchFamily="18" charset="0"/>
-                        <a:cs typeface="Times New Roman" panose="02020603050405020304" pitchFamily="18" charset="0"/>
-                      </a:endParaRPr>
-                    </a:p>
-                  </a:txBody>
-                  <a:tcPr>
-                    <a:lnL w="12700" cap="flat" cmpd="sng" algn="ctr">
-                      <a:noFill/>
-                      <a:prstDash val="solid"/>
-                      <a:round/>
-                      <a:headEnd type="none" w="med" len="med"/>
-                      <a:tailEnd type="none" w="med" len="med"/>
-                    </a:lnL>
-                    <a:lnR w="12700" cap="flat" cmpd="sng" algn="ctr">
-                      <a:noFill/>
-                      <a:prstDash val="solid"/>
-                      <a:round/>
-                      <a:headEnd type="none" w="med" len="med"/>
-                      <a:tailEnd type="none" w="med" len="med"/>
-                    </a:lnR>
-                    <a:lnT w="12700" cap="flat" cmpd="sng" algn="ctr">
-                      <a:noFill/>
-                      <a:prstDash val="solid"/>
-                      <a:round/>
-                      <a:headEnd type="none" w="med" len="med"/>
-                      <a:tailEnd type="none" w="med" len="med"/>
-                    </a:lnT>
-                    <a:lnB w="12700" cap="flat" cmpd="sng" algn="ctr">
-                      <a:noFill/>
-                      <a:prstDash val="solid"/>
-                      <a:round/>
-                      <a:headEnd type="none" w="med" len="med"/>
-                      <a:tailEnd type="none" w="med" len="med"/>
-                    </a:lnB>
-                    <a:lnTlToBr w="12700" cmpd="sng">
-                      <a:noFill/>
-                      <a:prstDash val="solid"/>
-                    </a:lnTlToBr>
-                    <a:lnBlToTr w="12700" cmpd="sng">
-                      <a:noFill/>
-                      <a:prstDash val="solid"/>
-                    </a:lnBlToTr>
-                    <a:noFill/>
-                  </a:tcPr>
-                </a:tc>
-                <a:tc>
-                  <a:txBody>
-                    <a:bodyPr/>
-                    <a:lstStyle/>
-                    <a:p>
-                      <a:pPr marL="0" algn="ctr" defTabSz="914400" rtl="0" eaLnBrk="1" latinLnBrk="0" hangingPunct="1"/>
-                      <a:r>
-                        <a:rPr lang="en-US" altLang="zh-CN" sz="2200" b="1" kern="1200" dirty="0">
-                          <a:solidFill>
-                            <a:srgbClr val="0000CC"/>
-                          </a:solidFill>
-                          <a:latin typeface="Times New Roman" panose="02020603050405020304" pitchFamily="18" charset="0"/>
-                          <a:ea typeface="+mn-ea"/>
-                          <a:cs typeface="Times New Roman" panose="02020603050405020304" pitchFamily="18" charset="0"/>
-                        </a:rPr>
-                        <a:t>4</a:t>
-                      </a:r>
-                      <a:endParaRPr lang="zh-CN" altLang="en-US" sz="2200" b="1" kern="1200" dirty="0">
-                        <a:solidFill>
-                          <a:srgbClr val="0000CC"/>
-                        </a:solidFill>
-                        <a:latin typeface="Times New Roman" panose="02020603050405020304" pitchFamily="18" charset="0"/>
-                        <a:ea typeface="+mn-ea"/>
-                        <a:cs typeface="Times New Roman" panose="02020603050405020304" pitchFamily="18" charset="0"/>
-                      </a:endParaRPr>
-                    </a:p>
-                  </a:txBody>
-                  <a:tcPr>
-                    <a:lnL w="12700" cap="flat" cmpd="sng" algn="ctr">
-                      <a:noFill/>
-                      <a:prstDash val="solid"/>
-                      <a:round/>
-                      <a:headEnd type="none" w="med" len="med"/>
-                      <a:tailEnd type="none" w="med" len="med"/>
-                    </a:lnL>
-                    <a:lnR w="12700" cap="flat" cmpd="sng" algn="ctr">
-                      <a:noFill/>
-                      <a:prstDash val="solid"/>
-                      <a:round/>
-                      <a:headEnd type="none" w="med" len="med"/>
-                      <a:tailEnd type="none" w="med" len="med"/>
-                    </a:lnR>
-                    <a:lnT w="12700" cap="flat" cmpd="sng" algn="ctr">
-                      <a:noFill/>
-                      <a:prstDash val="solid"/>
-                      <a:round/>
-                      <a:headEnd type="none" w="med" len="med"/>
-                      <a:tailEnd type="none" w="med" len="med"/>
-                    </a:lnT>
-                    <a:lnB w="12700" cap="flat" cmpd="sng" algn="ctr">
-                      <a:noFill/>
-                      <a:prstDash val="solid"/>
-                      <a:round/>
-                      <a:headEnd type="none" w="med" len="med"/>
-                      <a:tailEnd type="none" w="med" len="med"/>
-                    </a:lnB>
-                    <a:lnTlToBr w="12700" cmpd="sng">
-                      <a:noFill/>
-                      <a:prstDash val="solid"/>
-                    </a:lnTlToBr>
-                    <a:lnBlToTr w="12700" cmpd="sng">
-                      <a:noFill/>
-                      <a:prstDash val="solid"/>
-                    </a:lnBlToTr>
-                    <a:noFill/>
-                  </a:tcPr>
-                </a:tc>
-                <a:extLst>
-                  <a:ext uri="{0D108BD9-81ED-4DB2-BD59-A6C34878D82A}">
-                    <a16:rowId xmlns:a16="http://schemas.microsoft.com/office/drawing/2014/main" val="3369269062"/>
-                  </a:ext>
-                </a:extLst>
-              </a:tr>
-              <a:tr h="370840">
-                <a:tc>
-                  <a:txBody>
-                    <a:bodyPr/>
-                    <a:lstStyle/>
-                    <a:p>
-                      <a:pPr algn="ctr"/>
-                      <a:r>
-                        <a:rPr lang="en-US" altLang="zh-CN" sz="2200" b="1" dirty="0">
-                          <a:latin typeface="Times New Roman" panose="02020603050405020304" pitchFamily="18" charset="0"/>
-                          <a:cs typeface="Times New Roman" panose="02020603050405020304" pitchFamily="18" charset="0"/>
-                        </a:rPr>
-                        <a:t>(1, 5)</a:t>
-                      </a:r>
-                      <a:endParaRPr lang="zh-CN" altLang="en-US" sz="2200" b="1" dirty="0">
-                        <a:latin typeface="Times New Roman" panose="02020603050405020304" pitchFamily="18" charset="0"/>
-                        <a:cs typeface="Times New Roman" panose="02020603050405020304" pitchFamily="18" charset="0"/>
-                      </a:endParaRPr>
-                    </a:p>
-                  </a:txBody>
-                  <a:tcPr>
-                    <a:lnL w="12700" cap="flat" cmpd="sng" algn="ctr">
-                      <a:noFill/>
-                      <a:prstDash val="solid"/>
-                      <a:round/>
-                      <a:headEnd type="none" w="med" len="med"/>
-                      <a:tailEnd type="none" w="med" len="med"/>
-                    </a:lnL>
-                    <a:lnR w="12700" cap="flat" cmpd="sng" algn="ctr">
-                      <a:noFill/>
-                      <a:prstDash val="solid"/>
-                      <a:round/>
-                      <a:headEnd type="none" w="med" len="med"/>
-                      <a:tailEnd type="none" w="med" len="med"/>
-                    </a:lnR>
-                    <a:lnT w="12700" cap="flat" cmpd="sng" algn="ctr">
-                      <a:noFill/>
-                      <a:prstDash val="solid"/>
-                      <a:round/>
-                      <a:headEnd type="none" w="med" len="med"/>
-                      <a:tailEnd type="none" w="med" len="med"/>
-                    </a:lnT>
-                    <a:lnB w="12700" cap="flat" cmpd="sng" algn="ctr">
-                      <a:noFill/>
-                      <a:prstDash val="solid"/>
-                      <a:round/>
-                      <a:headEnd type="none" w="med" len="med"/>
-                      <a:tailEnd type="none" w="med" len="med"/>
-                    </a:lnB>
-                    <a:lnTlToBr w="12700" cmpd="sng">
-                      <a:noFill/>
-                      <a:prstDash val="solid"/>
-                    </a:lnTlToBr>
-                    <a:lnBlToTr w="12700" cmpd="sng">
-                      <a:noFill/>
-                      <a:prstDash val="solid"/>
-                    </a:lnBlToTr>
-                    <a:noFill/>
-                  </a:tcPr>
-                </a:tc>
-                <a:tc>
-                  <a:txBody>
-                    <a:bodyPr/>
-                    <a:lstStyle/>
-                    <a:p>
-                      <a:pPr algn="ctr"/>
-                      <a:r>
-                        <a:rPr lang="en-US" altLang="zh-CN" sz="2200" b="1" dirty="0">
-                          <a:solidFill>
-                            <a:srgbClr val="0099CC"/>
-                          </a:solidFill>
-                          <a:latin typeface="Times New Roman" panose="02020603050405020304" pitchFamily="18" charset="0"/>
-                          <a:cs typeface="Times New Roman" panose="02020603050405020304" pitchFamily="18" charset="0"/>
-                        </a:rPr>
-                        <a:t>6</a:t>
-                      </a:r>
-                      <a:endParaRPr lang="zh-CN" altLang="en-US" sz="2200" b="1" dirty="0">
-                        <a:solidFill>
-                          <a:srgbClr val="0099CC"/>
-                        </a:solidFill>
-                        <a:latin typeface="Times New Roman" panose="02020603050405020304" pitchFamily="18" charset="0"/>
-                        <a:cs typeface="Times New Roman" panose="02020603050405020304" pitchFamily="18" charset="0"/>
-                      </a:endParaRPr>
-                    </a:p>
-                  </a:txBody>
-                  <a:tcPr>
-                    <a:lnL w="12700" cap="flat" cmpd="sng" algn="ctr">
-                      <a:noFill/>
-                      <a:prstDash val="solid"/>
-                      <a:round/>
-                      <a:headEnd type="none" w="med" len="med"/>
-                      <a:tailEnd type="none" w="med" len="med"/>
-                    </a:lnL>
-                    <a:lnR w="12700" cap="flat" cmpd="sng" algn="ctr">
-                      <a:noFill/>
-                      <a:prstDash val="solid"/>
-                      <a:round/>
-                      <a:headEnd type="none" w="med" len="med"/>
-                      <a:tailEnd type="none" w="med" len="med"/>
-                    </a:lnR>
-                    <a:lnT w="12700" cap="flat" cmpd="sng" algn="ctr">
-                      <a:noFill/>
-                      <a:prstDash val="solid"/>
-                      <a:round/>
-                      <a:headEnd type="none" w="med" len="med"/>
-                      <a:tailEnd type="none" w="med" len="med"/>
-                    </a:lnT>
-                    <a:lnB w="12700" cap="flat" cmpd="sng" algn="ctr">
-                      <a:noFill/>
-                      <a:prstDash val="solid"/>
-                      <a:round/>
-                      <a:headEnd type="none" w="med" len="med"/>
-                      <a:tailEnd type="none" w="med" len="med"/>
-                    </a:lnB>
-                    <a:lnTlToBr w="12700" cmpd="sng">
-                      <a:noFill/>
-                      <a:prstDash val="solid"/>
-                    </a:lnTlToBr>
-                    <a:lnBlToTr w="12700" cmpd="sng">
-                      <a:noFill/>
-                      <a:prstDash val="solid"/>
-                    </a:lnBlToTr>
-                    <a:noFill/>
-                  </a:tcPr>
-                </a:tc>
-                <a:extLst>
-                  <a:ext uri="{0D108BD9-81ED-4DB2-BD59-A6C34878D82A}">
-                    <a16:rowId xmlns:a16="http://schemas.microsoft.com/office/drawing/2014/main" val="3866625333"/>
-                  </a:ext>
-                </a:extLst>
-              </a:tr>
-              <a:tr h="370840">
-                <a:tc>
-                  <a:txBody>
-                    <a:bodyPr/>
-                    <a:lstStyle/>
-                    <a:p>
-                      <a:pPr algn="ctr"/>
-                      <a:r>
-                        <a:rPr lang="en-US" altLang="zh-CN" sz="2200" b="1" dirty="0">
-                          <a:latin typeface="Times New Roman" panose="02020603050405020304" pitchFamily="18" charset="0"/>
-                          <a:cs typeface="Times New Roman" panose="02020603050405020304" pitchFamily="18" charset="0"/>
-                        </a:rPr>
-                        <a:t>(2, 5)</a:t>
-                      </a:r>
-                      <a:endParaRPr lang="zh-CN" altLang="en-US" sz="2200" b="1" dirty="0">
-                        <a:latin typeface="Times New Roman" panose="02020603050405020304" pitchFamily="18" charset="0"/>
-                        <a:cs typeface="Times New Roman" panose="02020603050405020304" pitchFamily="18" charset="0"/>
-                      </a:endParaRPr>
-                    </a:p>
-                  </a:txBody>
-                  <a:tcPr>
-                    <a:lnL w="12700" cap="flat" cmpd="sng" algn="ctr">
-                      <a:noFill/>
-                      <a:prstDash val="solid"/>
-                      <a:round/>
-                      <a:headEnd type="none" w="med" len="med"/>
-                      <a:tailEnd type="none" w="med" len="med"/>
-                    </a:lnL>
-                    <a:lnR w="12700" cap="flat" cmpd="sng" algn="ctr">
-                      <a:noFill/>
-                      <a:prstDash val="solid"/>
-                      <a:round/>
-                      <a:headEnd type="none" w="med" len="med"/>
-                      <a:tailEnd type="none" w="med" len="med"/>
-                    </a:lnR>
-                    <a:lnT w="12700" cap="flat" cmpd="sng" algn="ctr">
-                      <a:noFill/>
-                      <a:prstDash val="solid"/>
-                      <a:round/>
-                      <a:headEnd type="none" w="med" len="med"/>
-                      <a:tailEnd type="none" w="med" len="med"/>
-                    </a:lnT>
-                    <a:lnB w="12700" cap="flat" cmpd="sng" algn="ctr">
-                      <a:noFill/>
-                      <a:prstDash val="solid"/>
-                      <a:round/>
-                      <a:headEnd type="none" w="med" len="med"/>
-                      <a:tailEnd type="none" w="med" len="med"/>
-                    </a:lnB>
-                    <a:lnTlToBr w="12700" cmpd="sng">
-                      <a:noFill/>
-                      <a:prstDash val="solid"/>
-                    </a:lnTlToBr>
-                    <a:lnBlToTr w="12700" cmpd="sng">
-                      <a:noFill/>
-                      <a:prstDash val="solid"/>
-                    </a:lnBlToTr>
-                    <a:noFill/>
-                  </a:tcPr>
-                </a:tc>
-                <a:tc>
-                  <a:txBody>
-                    <a:bodyPr/>
-                    <a:lstStyle/>
-                    <a:p>
-                      <a:pPr algn="ctr"/>
-                      <a:r>
-                        <a:rPr lang="en-US" altLang="zh-CN" sz="2200" b="1" dirty="0">
-                          <a:solidFill>
-                            <a:srgbClr val="0099CC"/>
-                          </a:solidFill>
-                          <a:latin typeface="Times New Roman" panose="02020603050405020304" pitchFamily="18" charset="0"/>
-                          <a:cs typeface="Times New Roman" panose="02020603050405020304" pitchFamily="18" charset="0"/>
-                        </a:rPr>
-                        <a:t>6</a:t>
-                      </a:r>
-                      <a:endParaRPr lang="zh-CN" altLang="en-US" sz="2200" b="1" dirty="0">
-                        <a:solidFill>
-                          <a:srgbClr val="0099CC"/>
-                        </a:solidFill>
-                        <a:latin typeface="Times New Roman" panose="02020603050405020304" pitchFamily="18" charset="0"/>
-                        <a:cs typeface="Times New Roman" panose="02020603050405020304" pitchFamily="18" charset="0"/>
-                      </a:endParaRPr>
-                    </a:p>
-                  </a:txBody>
-                  <a:tcPr>
-                    <a:lnL w="12700" cap="flat" cmpd="sng" algn="ctr">
-                      <a:noFill/>
-                      <a:prstDash val="solid"/>
-                      <a:round/>
-                      <a:headEnd type="none" w="med" len="med"/>
-                      <a:tailEnd type="none" w="med" len="med"/>
-                    </a:lnL>
-                    <a:lnR w="12700" cap="flat" cmpd="sng" algn="ctr">
-                      <a:noFill/>
-                      <a:prstDash val="solid"/>
-                      <a:round/>
-                      <a:headEnd type="none" w="med" len="med"/>
-                      <a:tailEnd type="none" w="med" len="med"/>
-                    </a:lnR>
-                    <a:lnT w="12700" cap="flat" cmpd="sng" algn="ctr">
-                      <a:noFill/>
-                      <a:prstDash val="solid"/>
-                      <a:round/>
-                      <a:headEnd type="none" w="med" len="med"/>
-                      <a:tailEnd type="none" w="med" len="med"/>
-                    </a:lnT>
-                    <a:lnB w="12700" cap="flat" cmpd="sng" algn="ctr">
-                      <a:noFill/>
-                      <a:prstDash val="solid"/>
-                      <a:round/>
-                      <a:headEnd type="none" w="med" len="med"/>
-                      <a:tailEnd type="none" w="med" len="med"/>
-                    </a:lnB>
-                    <a:lnTlToBr w="12700" cmpd="sng">
-                      <a:noFill/>
-                      <a:prstDash val="solid"/>
-                    </a:lnTlToBr>
-                    <a:lnBlToTr w="12700" cmpd="sng">
-                      <a:noFill/>
-                      <a:prstDash val="solid"/>
-                    </a:lnBlToTr>
-                    <a:noFill/>
-                  </a:tcPr>
-                </a:tc>
-                <a:extLst>
-                  <a:ext uri="{0D108BD9-81ED-4DB2-BD59-A6C34878D82A}">
-                    <a16:rowId xmlns:a16="http://schemas.microsoft.com/office/drawing/2014/main" val="4177470859"/>
-                  </a:ext>
-                </a:extLst>
-              </a:tr>
-              <a:tr h="370840">
-                <a:tc>
-                  <a:txBody>
-                    <a:bodyPr/>
-                    <a:lstStyle/>
-                    <a:p>
-                      <a:pPr algn="ctr"/>
-                      <a:r>
-                        <a:rPr lang="en-US" altLang="zh-CN" sz="2200" b="1" dirty="0">
-                          <a:latin typeface="Times New Roman" panose="02020603050405020304" pitchFamily="18" charset="0"/>
-                          <a:cs typeface="Times New Roman" panose="02020603050405020304" pitchFamily="18" charset="0"/>
-                        </a:rPr>
-                        <a:t>(0, 6)</a:t>
-                      </a:r>
-                      <a:endParaRPr lang="zh-CN" altLang="en-US" sz="2200" b="1" dirty="0">
-                        <a:latin typeface="Times New Roman" panose="02020603050405020304" pitchFamily="18" charset="0"/>
-                        <a:cs typeface="Times New Roman" panose="02020603050405020304" pitchFamily="18" charset="0"/>
-                      </a:endParaRPr>
-                    </a:p>
-                  </a:txBody>
-                  <a:tcPr>
-                    <a:lnL w="12700" cap="flat" cmpd="sng" algn="ctr">
-                      <a:noFill/>
-                      <a:prstDash val="solid"/>
-                      <a:round/>
-                      <a:headEnd type="none" w="med" len="med"/>
-                      <a:tailEnd type="none" w="med" len="med"/>
-                    </a:lnL>
-                    <a:lnR w="12700" cap="flat" cmpd="sng" algn="ctr">
-                      <a:noFill/>
-                      <a:prstDash val="solid"/>
-                      <a:round/>
-                      <a:headEnd type="none" w="med" len="med"/>
-                      <a:tailEnd type="none" w="med" len="med"/>
-                    </a:lnR>
-                    <a:lnT w="12700" cap="flat" cmpd="sng" algn="ctr">
-                      <a:noFill/>
-                      <a:prstDash val="solid"/>
-                      <a:round/>
-                      <a:headEnd type="none" w="med" len="med"/>
-                      <a:tailEnd type="none" w="med" len="med"/>
-                    </a:lnT>
-                    <a:lnB w="12700" cap="flat" cmpd="sng" algn="ctr">
-                      <a:noFill/>
-                      <a:prstDash val="solid"/>
-                      <a:round/>
-                      <a:headEnd type="none" w="med" len="med"/>
-                      <a:tailEnd type="none" w="med" len="med"/>
-                    </a:lnB>
-                    <a:lnTlToBr w="12700" cmpd="sng">
-                      <a:noFill/>
-                      <a:prstDash val="solid"/>
-                    </a:lnTlToBr>
-                    <a:lnBlToTr w="12700" cmpd="sng">
-                      <a:noFill/>
-                      <a:prstDash val="solid"/>
-                    </a:lnBlToTr>
-                    <a:noFill/>
-                  </a:tcPr>
-                </a:tc>
-                <a:tc>
-                  <a:txBody>
-                    <a:bodyPr/>
-                    <a:lstStyle/>
-                    <a:p>
-                      <a:pPr marL="0" marR="0" lvl="0" indent="0" algn="ctr" defTabSz="914400" rtl="0" eaLnBrk="1" fontAlgn="auto" latinLnBrk="0" hangingPunct="1">
-                        <a:lnSpc>
-                          <a:spcPct val="100000"/>
-                        </a:lnSpc>
-                        <a:spcBef>
-                          <a:spcPts val="0"/>
-                        </a:spcBef>
-                        <a:spcAft>
-                          <a:spcPts val="0"/>
-                        </a:spcAft>
-                        <a:buClrTx/>
-                        <a:buSzTx/>
-                        <a:buFontTx/>
-                        <a:buNone/>
-                        <a:tabLst/>
-                        <a:defRPr/>
-                      </a:pPr>
-                      <a:r>
-                        <a:rPr lang="en-US" altLang="zh-CN" sz="2200" b="1" dirty="0">
-                          <a:solidFill>
-                            <a:schemeClr val="accent4">
-                              <a:lumMod val="75000"/>
-                            </a:schemeClr>
-                          </a:solidFill>
-                          <a:latin typeface="Times New Roman" panose="02020603050405020304" pitchFamily="18" charset="0"/>
-                          <a:cs typeface="Times New Roman" panose="02020603050405020304" pitchFamily="18" charset="0"/>
-                        </a:rPr>
-                        <a:t>5</a:t>
-                      </a:r>
-                      <a:endParaRPr lang="zh-CN" altLang="en-US" sz="2200" b="1" dirty="0">
-                        <a:solidFill>
-                          <a:schemeClr val="accent4">
-                            <a:lumMod val="75000"/>
-                          </a:schemeClr>
-                        </a:solidFill>
-                        <a:latin typeface="Times New Roman" panose="02020603050405020304" pitchFamily="18" charset="0"/>
-                        <a:cs typeface="Times New Roman" panose="02020603050405020304" pitchFamily="18" charset="0"/>
-                      </a:endParaRPr>
-                    </a:p>
-                  </a:txBody>
-                  <a:tcPr>
-                    <a:lnL w="12700" cap="flat" cmpd="sng" algn="ctr">
-                      <a:noFill/>
-                      <a:prstDash val="solid"/>
-                      <a:round/>
-                      <a:headEnd type="none" w="med" len="med"/>
-                      <a:tailEnd type="none" w="med" len="med"/>
-                    </a:lnL>
-                    <a:lnR w="12700" cap="flat" cmpd="sng" algn="ctr">
-                      <a:noFill/>
-                      <a:prstDash val="solid"/>
-                      <a:round/>
-                      <a:headEnd type="none" w="med" len="med"/>
-                      <a:tailEnd type="none" w="med" len="med"/>
-                    </a:lnR>
-                    <a:lnT w="12700" cap="flat" cmpd="sng" algn="ctr">
-                      <a:noFill/>
-                      <a:prstDash val="solid"/>
-                      <a:round/>
-                      <a:headEnd type="none" w="med" len="med"/>
-                      <a:tailEnd type="none" w="med" len="med"/>
-                    </a:lnT>
-                    <a:lnB w="12700" cap="flat" cmpd="sng" algn="ctr">
-                      <a:noFill/>
-                      <a:prstDash val="solid"/>
-                      <a:round/>
-                      <a:headEnd type="none" w="med" len="med"/>
-                      <a:tailEnd type="none" w="med" len="med"/>
-                    </a:lnB>
-                    <a:lnTlToBr w="12700" cmpd="sng">
-                      <a:noFill/>
-                      <a:prstDash val="solid"/>
-                    </a:lnTlToBr>
-                    <a:lnBlToTr w="12700" cmpd="sng">
-                      <a:noFill/>
-                      <a:prstDash val="solid"/>
-                    </a:lnBlToTr>
-                    <a:noFill/>
-                  </a:tcPr>
-                </a:tc>
-                <a:extLst>
-                  <a:ext uri="{0D108BD9-81ED-4DB2-BD59-A6C34878D82A}">
-                    <a16:rowId xmlns:a16="http://schemas.microsoft.com/office/drawing/2014/main" val="221414494"/>
-                  </a:ext>
-                </a:extLst>
-              </a:tr>
-            </a:tbl>
-          </a:graphicData>
-        </a:graphic>
-      </p:graphicFrame>
-      <p:cxnSp>
-        <p:nvCxnSpPr>
-          <p:cNvPr id="10" name="直接箭头连接符 9">
-            <a:extLst>
-              <a:ext uri="{FF2B5EF4-FFF2-40B4-BE49-F238E27FC236}">
-                <a16:creationId xmlns:a16="http://schemas.microsoft.com/office/drawing/2014/main" id="{5553CA85-5240-467F-BD83-110D4A0499F7}"/>
-              </a:ext>
-            </a:extLst>
-          </p:cNvPr>
-          <p:cNvCxnSpPr>
-            <a:stCxn id="5" idx="2"/>
-            <a:endCxn id="6" idx="0"/>
-          </p:cNvCxnSpPr>
-          <p:nvPr/>
-        </p:nvCxnSpPr>
-        <p:spPr>
-          <a:xfrm flipH="1">
-            <a:off x="9421324" y="1317308"/>
-            <a:ext cx="2711" cy="1294148"/>
-          </a:xfrm>
-          <a:prstGeom prst="straightConnector1">
-            <a:avLst/>
-          </a:prstGeom>
-          <a:ln w="44450">
-            <a:solidFill>
-              <a:srgbClr val="7030A0"/>
-            </a:solidFill>
-            <a:tailEnd type="triangle"/>
-          </a:ln>
-        </p:spPr>
-        <p:style>
-          <a:lnRef idx="1">
-            <a:schemeClr val="dk1"/>
-          </a:lnRef>
-          <a:fillRef idx="0">
-            <a:schemeClr val="dk1"/>
-          </a:fillRef>
-          <a:effectRef idx="0">
-            <a:schemeClr val="dk1"/>
-          </a:effectRef>
-          <a:fontRef idx="minor">
-            <a:schemeClr val="tx1"/>
-          </a:fontRef>
-        </p:style>
-      </p:cxnSp>
-      <p:cxnSp>
-        <p:nvCxnSpPr>
-          <p:cNvPr id="12" name="直接箭头连接符 11">
-            <a:extLst>
-              <a:ext uri="{FF2B5EF4-FFF2-40B4-BE49-F238E27FC236}">
-                <a16:creationId xmlns:a16="http://schemas.microsoft.com/office/drawing/2014/main" id="{A962A446-1BBA-43EA-9C9F-3D7BC892F533}"/>
-              </a:ext>
-            </a:extLst>
-          </p:cNvPr>
-          <p:cNvCxnSpPr>
-            <a:cxnSpLocks/>
-            <a:stCxn id="4" idx="2"/>
-            <a:endCxn id="21" idx="0"/>
-          </p:cNvCxnSpPr>
-          <p:nvPr/>
-        </p:nvCxnSpPr>
-        <p:spPr>
-          <a:xfrm flipH="1">
-            <a:off x="10229301" y="1317308"/>
-            <a:ext cx="698381" cy="3511145"/>
-          </a:xfrm>
-          <a:prstGeom prst="straightConnector1">
-            <a:avLst/>
-          </a:prstGeom>
-          <a:ln w="44450">
-            <a:solidFill>
-              <a:srgbClr val="0099CC"/>
-            </a:solidFill>
-            <a:prstDash val="sysDash"/>
-            <a:tailEnd type="triangle"/>
-          </a:ln>
-        </p:spPr>
-        <p:style>
-          <a:lnRef idx="1">
-            <a:schemeClr val="dk1"/>
-          </a:lnRef>
-          <a:fillRef idx="0">
-            <a:schemeClr val="dk1"/>
-          </a:fillRef>
-          <a:effectRef idx="0">
-            <a:schemeClr val="dk1"/>
-          </a:effectRef>
-          <a:fontRef idx="minor">
-            <a:schemeClr val="tx1"/>
-          </a:fontRef>
-        </p:style>
-      </p:cxnSp>
-      <p:cxnSp>
-        <p:nvCxnSpPr>
-          <p:cNvPr id="13" name="直接箭头连接符 12">
-            <a:extLst>
-              <a:ext uri="{FF2B5EF4-FFF2-40B4-BE49-F238E27FC236}">
-                <a16:creationId xmlns:a16="http://schemas.microsoft.com/office/drawing/2014/main" id="{16701F89-856D-41A2-A17B-88C1C431F0C7}"/>
-              </a:ext>
-            </a:extLst>
-          </p:cNvPr>
-          <p:cNvCxnSpPr>
-            <a:cxnSpLocks/>
-            <a:stCxn id="6" idx="2"/>
-            <a:endCxn id="7" idx="0"/>
-          </p:cNvCxnSpPr>
-          <p:nvPr/>
-        </p:nvCxnSpPr>
-        <p:spPr>
-          <a:xfrm flipH="1">
-            <a:off x="8906636" y="3000076"/>
-            <a:ext cx="514688" cy="600798"/>
-          </a:xfrm>
-          <a:prstGeom prst="straightConnector1">
-            <a:avLst/>
-          </a:prstGeom>
-          <a:ln w="44450">
-            <a:solidFill>
-              <a:srgbClr val="0000CC"/>
-            </a:solidFill>
-            <a:prstDash val="sysDash"/>
-            <a:tailEnd type="triangle"/>
-          </a:ln>
-        </p:spPr>
-        <p:style>
-          <a:lnRef idx="1">
-            <a:schemeClr val="dk1"/>
-          </a:lnRef>
-          <a:fillRef idx="0">
-            <a:schemeClr val="dk1"/>
-          </a:fillRef>
-          <a:effectRef idx="0">
-            <a:schemeClr val="dk1"/>
-          </a:effectRef>
-          <a:fontRef idx="minor">
-            <a:schemeClr val="tx1"/>
-          </a:fontRef>
-        </p:style>
-      </p:cxnSp>
-      <p:cxnSp>
-        <p:nvCxnSpPr>
-          <p:cNvPr id="14" name="直接箭头连接符 13">
-            <a:extLst>
-              <a:ext uri="{FF2B5EF4-FFF2-40B4-BE49-F238E27FC236}">
-                <a16:creationId xmlns:a16="http://schemas.microsoft.com/office/drawing/2014/main" id="{BF391BB1-97E3-45B6-A215-137C809D55CB}"/>
-              </a:ext>
-            </a:extLst>
-          </p:cNvPr>
-          <p:cNvCxnSpPr>
-            <a:cxnSpLocks/>
-            <a:stCxn id="5" idx="2"/>
-            <a:endCxn id="22" idx="0"/>
-          </p:cNvCxnSpPr>
-          <p:nvPr/>
-        </p:nvCxnSpPr>
-        <p:spPr>
-          <a:xfrm>
-            <a:off x="9424035" y="1317308"/>
-            <a:ext cx="1943710" cy="3511145"/>
-          </a:xfrm>
-          <a:prstGeom prst="straightConnector1">
-            <a:avLst/>
-          </a:prstGeom>
-          <a:ln w="44450">
-            <a:solidFill>
-              <a:schemeClr val="accent4">
-                <a:lumMod val="75000"/>
-              </a:schemeClr>
-            </a:solidFill>
-            <a:prstDash val="sysDot"/>
-            <a:tailEnd type="triangle"/>
-          </a:ln>
-        </p:spPr>
-        <p:style>
-          <a:lnRef idx="1">
-            <a:schemeClr val="dk1"/>
-          </a:lnRef>
-          <a:fillRef idx="0">
-            <a:schemeClr val="dk1"/>
-          </a:fillRef>
-          <a:effectRef idx="0">
-            <a:schemeClr val="dk1"/>
-          </a:effectRef>
-          <a:fontRef idx="minor">
-            <a:schemeClr val="tx1"/>
-          </a:fontRef>
-        </p:style>
-      </p:cxnSp>
-      <p:sp>
-        <p:nvSpPr>
           <p:cNvPr id="15" name="文本框 14">
             <a:extLst>
               <a:ext uri="{FF2B5EF4-FFF2-40B4-BE49-F238E27FC236}">
@@ -13409,8 +11943,8 @@
         </p:nvSpPr>
         <p:spPr>
           <a:xfrm>
-            <a:off x="391988" y="1834895"/>
-            <a:ext cx="4966075" cy="3828401"/>
+            <a:off x="8000551" y="1732199"/>
+            <a:ext cx="4299662" cy="3170099"/>
           </a:xfrm>
           <a:prstGeom prst="rect">
             <a:avLst/>
@@ -13424,7 +11958,7 @@
           <a:lstStyle/>
           <a:p>
             <a:r>
-              <a:rPr lang="en-US" altLang="zh-CN" sz="2800" b="1" dirty="0">
+              <a:rPr lang="en-US" altLang="zh-CN" sz="2000" b="1" dirty="0">
                 <a:latin typeface="Arial" panose="020B0604020202020204" pitchFamily="34" charset="0"/>
                 <a:cs typeface="Arial" panose="020B0604020202020204" pitchFamily="34" charset="0"/>
               </a:rPr>
@@ -13433,7 +11967,7 @@
           </a:p>
           <a:p>
             <a:r>
-              <a:rPr lang="en-US" altLang="zh-CN" sz="2400" b="1" dirty="0">
+              <a:rPr lang="en-US" altLang="zh-CN" sz="2000" b="1" dirty="0">
                 <a:latin typeface="Arial" panose="020B0604020202020204" pitchFamily="34" charset="0"/>
                 <a:cs typeface="Arial" panose="020B0604020202020204" pitchFamily="34" charset="0"/>
               </a:rPr>
@@ -13442,7 +11976,7 @@
           </a:p>
           <a:p>
             <a:r>
-              <a:rPr lang="en-US" altLang="zh-CN" sz="2400" b="1" dirty="0">
+              <a:rPr lang="en-US" altLang="zh-CN" sz="2000" b="1" dirty="0">
                 <a:solidFill>
                   <a:schemeClr val="accent1">
                     <a:lumMod val="75000"/>
@@ -13456,7 +11990,7 @@
           </a:p>
           <a:p>
             <a:r>
-              <a:rPr lang="en-US" altLang="zh-CN" sz="2400" b="1" dirty="0">
+              <a:rPr lang="en-US" altLang="zh-CN" sz="2000" b="1" dirty="0">
                 <a:solidFill>
                   <a:srgbClr val="7030A0"/>
                 </a:solidFill>
@@ -13468,7 +12002,7 @@
           </a:p>
           <a:p>
             <a:r>
-              <a:rPr lang="en-US" altLang="zh-CN" sz="2400" b="1" dirty="0">
+              <a:rPr lang="en-US" altLang="zh-CN" sz="2000" b="1" dirty="0">
                 <a:solidFill>
                   <a:schemeClr val="accent2">
                     <a:lumMod val="75000"/>
@@ -13482,7 +12016,7 @@
           </a:p>
           <a:p>
             <a:r>
-              <a:rPr lang="en-US" altLang="zh-CN" sz="2400" b="1" dirty="0">
+              <a:rPr lang="en-US" altLang="zh-CN" sz="2000" b="1" dirty="0">
                 <a:solidFill>
                   <a:srgbClr val="0000CC"/>
                 </a:solidFill>
@@ -13494,7 +12028,7 @@
           </a:p>
           <a:p>
             <a:r>
-              <a:rPr lang="en-US" altLang="zh-CN" sz="2400" b="1" dirty="0">
+              <a:rPr lang="en-US" altLang="zh-CN" sz="2000" b="1" dirty="0">
                 <a:solidFill>
                   <a:schemeClr val="accent4">
                     <a:lumMod val="75000"/>
@@ -13506,7 +12040,7 @@
               <a:t>5: 3x3 </a:t>
             </a:r>
             <a:r>
-              <a:rPr lang="en-US" altLang="zh-CN" sz="2400" b="1" dirty="0" err="1">
+              <a:rPr lang="en-US" altLang="zh-CN" sz="2000" b="1" dirty="0" err="1">
                 <a:solidFill>
                   <a:schemeClr val="accent4">
                     <a:lumMod val="75000"/>
@@ -13518,7 +12052,7 @@
               <a:t>depthwise</a:t>
             </a:r>
             <a:r>
-              <a:rPr lang="en-US" altLang="zh-CN" sz="2400" b="1" dirty="0">
+              <a:rPr lang="en-US" altLang="zh-CN" sz="2000" b="1" dirty="0">
                 <a:solidFill>
                   <a:schemeClr val="accent4">
                     <a:lumMod val="75000"/>
@@ -13532,7 +12066,7 @@
           </a:p>
           <a:p>
             <a:r>
-              <a:rPr lang="en-US" altLang="zh-CN" sz="2400" b="1" dirty="0">
+              <a:rPr lang="en-US" altLang="zh-CN" sz="2000" b="1" dirty="0">
                 <a:solidFill>
                   <a:srgbClr val="0099CC"/>
                 </a:solidFill>
@@ -13544,7 +12078,7 @@
           </a:p>
           <a:p>
             <a:r>
-              <a:rPr lang="en-US" altLang="zh-CN" sz="2400" b="1" dirty="0">
+              <a:rPr lang="en-US" altLang="zh-CN" sz="2000" b="1" dirty="0">
                 <a:solidFill>
                   <a:schemeClr val="accent6">
                     <a:lumMod val="75000"/>
@@ -13557,92 +12091,582 @@
             </a:r>
           </a:p>
           <a:p>
-            <a:endParaRPr lang="zh-CN" altLang="en-US" sz="2400" b="1" dirty="0">
+            <a:endParaRPr lang="zh-CN" altLang="en-US" sz="2000" b="1" dirty="0">
               <a:latin typeface="Arial" panose="020B0604020202020204" pitchFamily="34" charset="0"/>
               <a:cs typeface="Arial" panose="020B0604020202020204" pitchFamily="34" charset="0"/>
             </a:endParaRPr>
           </a:p>
         </p:txBody>
       </p:sp>
-      <p:sp>
-        <p:nvSpPr>
-          <p:cNvPr id="16" name="箭头: 右 15">
-            <a:extLst>
-              <a:ext uri="{FF2B5EF4-FFF2-40B4-BE49-F238E27FC236}">
-                <a16:creationId xmlns:a16="http://schemas.microsoft.com/office/drawing/2014/main" id="{C960323D-F572-49E0-BDCF-6F808A219CD4}"/>
-              </a:ext>
-            </a:extLst>
-          </p:cNvPr>
-          <p:cNvSpPr/>
+      <p:grpSp>
+        <p:nvGrpSpPr>
+          <p:cNvPr id="3" name="组合 2">
+            <a:extLst>
+              <a:ext uri="{FF2B5EF4-FFF2-40B4-BE49-F238E27FC236}">
+                <a16:creationId xmlns:a16="http://schemas.microsoft.com/office/drawing/2014/main" id="{015D9AC5-CB16-4327-93AF-AF0AF5093EE3}"/>
+              </a:ext>
+            </a:extLst>
+          </p:cNvPr>
+          <p:cNvGrpSpPr/>
           <p:nvPr/>
-        </p:nvSpPr>
-        <p:spPr>
+        </p:nvGrpSpPr>
+        <p:grpSpPr>
           <a:xfrm>
-            <a:off x="7747910" y="3293963"/>
-            <a:ext cx="761127" cy="369571"/>
+            <a:off x="5293048" y="1048274"/>
+            <a:ext cx="3158850" cy="5444601"/>
+            <a:chOff x="8547985" y="928688"/>
+            <a:chExt cx="3158850" cy="5444601"/>
           </a:xfrm>
-          <a:prstGeom prst="rightArrow">
-            <a:avLst/>
-          </a:prstGeom>
-        </p:spPr>
-        <p:style>
-          <a:lnRef idx="2">
-            <a:schemeClr val="dk1">
-              <a:shade val="50000"/>
-            </a:schemeClr>
-          </a:lnRef>
-          <a:fillRef idx="1">
-            <a:schemeClr val="dk1"/>
-          </a:fillRef>
-          <a:effectRef idx="0">
-            <a:schemeClr val="dk1"/>
-          </a:effectRef>
-          <a:fontRef idx="minor">
-            <a:schemeClr val="lt1"/>
-          </a:fontRef>
-        </p:style>
-        <p:txBody>
-          <a:bodyPr rtlCol="0" anchor="ctr"/>
-          <a:lstStyle/>
-          <a:p>
-            <a:pPr algn="ctr"/>
-            <a:endParaRPr lang="zh-CN" altLang="en-US" b="1">
-              <a:latin typeface="Arial" panose="020B0604020202020204" pitchFamily="34" charset="0"/>
-              <a:cs typeface="Arial" panose="020B0604020202020204" pitchFamily="34" charset="0"/>
-            </a:endParaRPr>
-          </a:p>
-        </p:txBody>
-      </p:sp>
-      <p:sp>
-        <p:nvSpPr>
-          <p:cNvPr id="26" name="矩形 25">
-            <a:extLst>
-              <a:ext uri="{FF2B5EF4-FFF2-40B4-BE49-F238E27FC236}">
-                <a16:creationId xmlns:a16="http://schemas.microsoft.com/office/drawing/2014/main" id="{9B9D38A8-5C79-461A-AF90-92A127743DDB}"/>
-              </a:ext>
-            </a:extLst>
-          </p:cNvPr>
-          <p:cNvSpPr/>
-          <p:nvPr/>
-        </p:nvSpPr>
-        <p:spPr>
-          <a:xfrm>
-            <a:off x="9869325" y="2018723"/>
-            <a:ext cx="374749" cy="369332"/>
-          </a:xfrm>
-          <a:prstGeom prst="rect">
-            <a:avLst/>
-          </a:prstGeom>
-        </p:spPr>
-        <p:txBody>
-          <a:bodyPr wrap="square">
-            <a:spAutoFit/>
-          </a:bodyPr>
-          <a:lstStyle/>
-          <a:p>
-            <a:pPr algn="ctr"/>
-            <a:r>
-              <a:rPr lang="en-US" altLang="zh-CN" b="1" dirty="0">
+        </p:grpSpPr>
+        <p:sp>
+          <p:nvSpPr>
+            <p:cNvPr id="4" name="矩形 3">
+              <a:extLst>
+                <a:ext uri="{FF2B5EF4-FFF2-40B4-BE49-F238E27FC236}">
+                  <a16:creationId xmlns:a16="http://schemas.microsoft.com/office/drawing/2014/main" id="{27446143-D64E-4809-AD2A-D3643A939526}"/>
+                </a:ext>
+              </a:extLst>
+            </p:cNvPr>
+            <p:cNvSpPr/>
+            <p:nvPr/>
+          </p:nvSpPr>
+          <p:spPr>
+            <a:xfrm>
+              <a:off x="10588592" y="928688"/>
+              <a:ext cx="678180" cy="388620"/>
+            </a:xfrm>
+            <a:prstGeom prst="rect">
+              <a:avLst/>
+            </a:prstGeom>
+            <a:noFill/>
+            <a:ln w="38100"/>
+          </p:spPr>
+          <p:style>
+            <a:lnRef idx="2">
+              <a:schemeClr val="dk1">
+                <a:shade val="50000"/>
+              </a:schemeClr>
+            </a:lnRef>
+            <a:fillRef idx="1">
+              <a:schemeClr val="dk1"/>
+            </a:fillRef>
+            <a:effectRef idx="0">
+              <a:schemeClr val="dk1"/>
+            </a:effectRef>
+            <a:fontRef idx="minor">
+              <a:schemeClr val="lt1"/>
+            </a:fontRef>
+          </p:style>
+          <p:txBody>
+            <a:bodyPr rtlCol="0" anchor="ctr"/>
+            <a:lstStyle/>
+            <a:p>
+              <a:pPr algn="ctr"/>
+              <a:r>
+                <a:rPr lang="en-US" altLang="zh-CN" b="1" dirty="0">
+                  <a:solidFill>
+                    <a:schemeClr val="tx1"/>
+                  </a:solidFill>
+                  <a:latin typeface="Arial" panose="020B0604020202020204" pitchFamily="34" charset="0"/>
+                  <a:cs typeface="Arial" panose="020B0604020202020204" pitchFamily="34" charset="0"/>
+                </a:rPr>
+                <a:t>1</a:t>
+              </a:r>
+              <a:endParaRPr lang="zh-CN" altLang="en-US" b="1" dirty="0">
+                <a:solidFill>
+                  <a:schemeClr val="tx1"/>
+                </a:solidFill>
+                <a:latin typeface="Arial" panose="020B0604020202020204" pitchFamily="34" charset="0"/>
+                <a:cs typeface="Arial" panose="020B0604020202020204" pitchFamily="34" charset="0"/>
+              </a:endParaRPr>
+            </a:p>
+          </p:txBody>
+        </p:sp>
+        <p:sp>
+          <p:nvSpPr>
+            <p:cNvPr id="5" name="矩形 4">
+              <a:extLst>
+                <a:ext uri="{FF2B5EF4-FFF2-40B4-BE49-F238E27FC236}">
+                  <a16:creationId xmlns:a16="http://schemas.microsoft.com/office/drawing/2014/main" id="{8CDC6B79-6F9B-4E98-A76D-4E9603D32442}"/>
+                </a:ext>
+              </a:extLst>
+            </p:cNvPr>
+            <p:cNvSpPr/>
+            <p:nvPr/>
+          </p:nvSpPr>
+          <p:spPr>
+            <a:xfrm>
+              <a:off x="9084945" y="928688"/>
+              <a:ext cx="678180" cy="388620"/>
+            </a:xfrm>
+            <a:prstGeom prst="rect">
+              <a:avLst/>
+            </a:prstGeom>
+            <a:noFill/>
+            <a:ln w="38100"/>
+          </p:spPr>
+          <p:style>
+            <a:lnRef idx="2">
+              <a:schemeClr val="dk1">
+                <a:shade val="50000"/>
+              </a:schemeClr>
+            </a:lnRef>
+            <a:fillRef idx="1">
+              <a:schemeClr val="dk1"/>
+            </a:fillRef>
+            <a:effectRef idx="0">
+              <a:schemeClr val="dk1"/>
+            </a:effectRef>
+            <a:fontRef idx="minor">
+              <a:schemeClr val="lt1"/>
+            </a:fontRef>
+          </p:style>
+          <p:txBody>
+            <a:bodyPr rtlCol="0" anchor="ctr"/>
+            <a:lstStyle/>
+            <a:p>
+              <a:pPr algn="ctr"/>
+              <a:r>
+                <a:rPr lang="en-US" altLang="zh-CN" b="1" dirty="0">
+                  <a:solidFill>
+                    <a:schemeClr val="tx1"/>
+                  </a:solidFill>
+                  <a:latin typeface="Arial" panose="020B0604020202020204" pitchFamily="34" charset="0"/>
+                  <a:cs typeface="Arial" panose="020B0604020202020204" pitchFamily="34" charset="0"/>
+                </a:rPr>
+                <a:t>0</a:t>
+              </a:r>
+              <a:endParaRPr lang="zh-CN" altLang="en-US" b="1" dirty="0">
+                <a:solidFill>
+                  <a:schemeClr val="tx1"/>
+                </a:solidFill>
+                <a:latin typeface="Arial" panose="020B0604020202020204" pitchFamily="34" charset="0"/>
+                <a:cs typeface="Arial" panose="020B0604020202020204" pitchFamily="34" charset="0"/>
+              </a:endParaRPr>
+            </a:p>
+          </p:txBody>
+        </p:sp>
+        <p:sp>
+          <p:nvSpPr>
+            <p:cNvPr id="6" name="矩形 5">
+              <a:extLst>
+                <a:ext uri="{FF2B5EF4-FFF2-40B4-BE49-F238E27FC236}">
+                  <a16:creationId xmlns:a16="http://schemas.microsoft.com/office/drawing/2014/main" id="{B25ED3E5-1E62-4577-B1A9-DFE39D6DC3C1}"/>
+                </a:ext>
+              </a:extLst>
+            </p:cNvPr>
+            <p:cNvSpPr/>
+            <p:nvPr/>
+          </p:nvSpPr>
+          <p:spPr>
+            <a:xfrm>
+              <a:off x="9082234" y="2611456"/>
+              <a:ext cx="678180" cy="388620"/>
+            </a:xfrm>
+            <a:prstGeom prst="rect">
+              <a:avLst/>
+            </a:prstGeom>
+            <a:noFill/>
+            <a:ln w="38100"/>
+          </p:spPr>
+          <p:style>
+            <a:lnRef idx="2">
+              <a:schemeClr val="dk1">
+                <a:shade val="50000"/>
+              </a:schemeClr>
+            </a:lnRef>
+            <a:fillRef idx="1">
+              <a:schemeClr val="dk1"/>
+            </a:fillRef>
+            <a:effectRef idx="0">
+              <a:schemeClr val="dk1"/>
+            </a:effectRef>
+            <a:fontRef idx="minor">
+              <a:schemeClr val="lt1"/>
+            </a:fontRef>
+          </p:style>
+          <p:txBody>
+            <a:bodyPr rtlCol="0" anchor="ctr"/>
+            <a:lstStyle/>
+            <a:p>
+              <a:pPr algn="ctr"/>
+              <a:r>
+                <a:rPr lang="en-US" altLang="zh-CN" b="1" dirty="0">
+                  <a:solidFill>
+                    <a:schemeClr val="tx1"/>
+                  </a:solidFill>
+                  <a:latin typeface="Arial" panose="020B0604020202020204" pitchFamily="34" charset="0"/>
+                  <a:cs typeface="Arial" panose="020B0604020202020204" pitchFamily="34" charset="0"/>
+                </a:rPr>
+                <a:t>2</a:t>
+              </a:r>
+              <a:endParaRPr lang="zh-CN" altLang="en-US" b="1" dirty="0">
+                <a:solidFill>
+                  <a:schemeClr val="tx1"/>
+                </a:solidFill>
+                <a:latin typeface="Arial" panose="020B0604020202020204" pitchFamily="34" charset="0"/>
+                <a:cs typeface="Arial" panose="020B0604020202020204" pitchFamily="34" charset="0"/>
+              </a:endParaRPr>
+            </a:p>
+          </p:txBody>
+        </p:sp>
+        <p:sp>
+          <p:nvSpPr>
+            <p:cNvPr id="7" name="矩形 6">
+              <a:extLst>
+                <a:ext uri="{FF2B5EF4-FFF2-40B4-BE49-F238E27FC236}">
+                  <a16:creationId xmlns:a16="http://schemas.microsoft.com/office/drawing/2014/main" id="{20DA319B-EB45-4064-B4CA-7C7CBE2DDC14}"/>
+                </a:ext>
+              </a:extLst>
+            </p:cNvPr>
+            <p:cNvSpPr/>
+            <p:nvPr/>
+          </p:nvSpPr>
+          <p:spPr>
+            <a:xfrm>
+              <a:off x="8567546" y="3600874"/>
+              <a:ext cx="678180" cy="388620"/>
+            </a:xfrm>
+            <a:prstGeom prst="rect">
+              <a:avLst/>
+            </a:prstGeom>
+            <a:noFill/>
+            <a:ln w="38100"/>
+          </p:spPr>
+          <p:style>
+            <a:lnRef idx="2">
+              <a:schemeClr val="dk1">
+                <a:shade val="50000"/>
+              </a:schemeClr>
+            </a:lnRef>
+            <a:fillRef idx="1">
+              <a:schemeClr val="dk1"/>
+            </a:fillRef>
+            <a:effectRef idx="0">
+              <a:schemeClr val="dk1"/>
+            </a:effectRef>
+            <a:fontRef idx="minor">
+              <a:schemeClr val="lt1"/>
+            </a:fontRef>
+          </p:style>
+          <p:txBody>
+            <a:bodyPr rtlCol="0" anchor="ctr"/>
+            <a:lstStyle/>
+            <a:p>
+              <a:pPr algn="ctr"/>
+              <a:r>
+                <a:rPr lang="en-US" altLang="zh-CN" b="1" dirty="0">
+                  <a:solidFill>
+                    <a:schemeClr val="tx1"/>
+                  </a:solidFill>
+                  <a:latin typeface="Arial" panose="020B0604020202020204" pitchFamily="34" charset="0"/>
+                  <a:cs typeface="Arial" panose="020B0604020202020204" pitchFamily="34" charset="0"/>
+                </a:rPr>
+                <a:t>3</a:t>
+              </a:r>
+              <a:endParaRPr lang="zh-CN" altLang="en-US" b="1" dirty="0">
+                <a:solidFill>
+                  <a:schemeClr val="tx1"/>
+                </a:solidFill>
+                <a:latin typeface="Arial" panose="020B0604020202020204" pitchFamily="34" charset="0"/>
+                <a:cs typeface="Arial" panose="020B0604020202020204" pitchFamily="34" charset="0"/>
+              </a:endParaRPr>
+            </a:p>
+          </p:txBody>
+        </p:sp>
+        <p:sp>
+          <p:nvSpPr>
+            <p:cNvPr id="8" name="矩形 7">
+              <a:extLst>
+                <a:ext uri="{FF2B5EF4-FFF2-40B4-BE49-F238E27FC236}">
+                  <a16:creationId xmlns:a16="http://schemas.microsoft.com/office/drawing/2014/main" id="{89E30F83-6C30-4892-84D9-EA39963312F7}"/>
+                </a:ext>
+              </a:extLst>
+            </p:cNvPr>
+            <p:cNvSpPr/>
+            <p:nvPr/>
+          </p:nvSpPr>
+          <p:spPr>
+            <a:xfrm>
+              <a:off x="8547985" y="4795272"/>
+              <a:ext cx="678180" cy="388620"/>
+            </a:xfrm>
+            <a:prstGeom prst="rect">
+              <a:avLst/>
+            </a:prstGeom>
+            <a:noFill/>
+            <a:ln w="38100"/>
+          </p:spPr>
+          <p:style>
+            <a:lnRef idx="2">
+              <a:schemeClr val="dk1">
+                <a:shade val="50000"/>
+              </a:schemeClr>
+            </a:lnRef>
+            <a:fillRef idx="1">
+              <a:schemeClr val="dk1"/>
+            </a:fillRef>
+            <a:effectRef idx="0">
+              <a:schemeClr val="dk1"/>
+            </a:effectRef>
+            <a:fontRef idx="minor">
+              <a:schemeClr val="lt1"/>
+            </a:fontRef>
+          </p:style>
+          <p:txBody>
+            <a:bodyPr rtlCol="0" anchor="ctr"/>
+            <a:lstStyle/>
+            <a:p>
+              <a:pPr algn="ctr"/>
+              <a:r>
+                <a:rPr lang="en-US" altLang="zh-CN" b="1" dirty="0">
+                  <a:solidFill>
+                    <a:schemeClr val="tx1"/>
+                  </a:solidFill>
+                  <a:latin typeface="Arial" panose="020B0604020202020204" pitchFamily="34" charset="0"/>
+                  <a:cs typeface="Arial" panose="020B0604020202020204" pitchFamily="34" charset="0"/>
+                </a:rPr>
+                <a:t>4</a:t>
+              </a:r>
+              <a:endParaRPr lang="zh-CN" altLang="en-US" b="1" dirty="0">
+                <a:solidFill>
+                  <a:schemeClr val="tx1"/>
+                </a:solidFill>
+                <a:latin typeface="Arial" panose="020B0604020202020204" pitchFamily="34" charset="0"/>
+                <a:cs typeface="Arial" panose="020B0604020202020204" pitchFamily="34" charset="0"/>
+              </a:endParaRPr>
+            </a:p>
+          </p:txBody>
+        </p:sp>
+        <p:cxnSp>
+          <p:nvCxnSpPr>
+            <p:cNvPr id="10" name="直接箭头连接符 9">
+              <a:extLst>
+                <a:ext uri="{FF2B5EF4-FFF2-40B4-BE49-F238E27FC236}">
+                  <a16:creationId xmlns:a16="http://schemas.microsoft.com/office/drawing/2014/main" id="{5553CA85-5240-467F-BD83-110D4A0499F7}"/>
+                </a:ext>
+              </a:extLst>
+            </p:cNvPr>
+            <p:cNvCxnSpPr>
+              <a:stCxn id="5" idx="2"/>
+              <a:endCxn id="6" idx="0"/>
+            </p:cNvCxnSpPr>
+            <p:nvPr/>
+          </p:nvCxnSpPr>
+          <p:spPr>
+            <a:xfrm flipH="1">
+              <a:off x="9421324" y="1317308"/>
+              <a:ext cx="2711" cy="1294148"/>
+            </a:xfrm>
+            <a:prstGeom prst="straightConnector1">
+              <a:avLst/>
+            </a:prstGeom>
+            <a:ln w="44450">
+              <a:solidFill>
+                <a:srgbClr val="7030A0"/>
+              </a:solidFill>
+              <a:tailEnd type="triangle"/>
+            </a:ln>
+          </p:spPr>
+          <p:style>
+            <a:lnRef idx="1">
+              <a:schemeClr val="dk1"/>
+            </a:lnRef>
+            <a:fillRef idx="0">
+              <a:schemeClr val="dk1"/>
+            </a:fillRef>
+            <a:effectRef idx="0">
+              <a:schemeClr val="dk1"/>
+            </a:effectRef>
+            <a:fontRef idx="minor">
+              <a:schemeClr val="tx1"/>
+            </a:fontRef>
+          </p:style>
+        </p:cxnSp>
+        <p:cxnSp>
+          <p:nvCxnSpPr>
+            <p:cNvPr id="12" name="直接箭头连接符 11">
+              <a:extLst>
+                <a:ext uri="{FF2B5EF4-FFF2-40B4-BE49-F238E27FC236}">
+                  <a16:creationId xmlns:a16="http://schemas.microsoft.com/office/drawing/2014/main" id="{A962A446-1BBA-43EA-9C9F-3D7BC892F533}"/>
+                </a:ext>
+              </a:extLst>
+            </p:cNvPr>
+            <p:cNvCxnSpPr>
+              <a:cxnSpLocks/>
+              <a:stCxn id="4" idx="2"/>
+              <a:endCxn id="21" idx="0"/>
+            </p:cNvCxnSpPr>
+            <p:nvPr/>
+          </p:nvCxnSpPr>
+          <p:spPr>
+            <a:xfrm flipH="1">
+              <a:off x="10229301" y="1317308"/>
+              <a:ext cx="698381" cy="3511145"/>
+            </a:xfrm>
+            <a:prstGeom prst="straightConnector1">
+              <a:avLst/>
+            </a:prstGeom>
+            <a:ln w="44450">
+              <a:solidFill>
+                <a:srgbClr val="0099CC"/>
+              </a:solidFill>
+              <a:prstDash val="sysDash"/>
+              <a:tailEnd type="triangle"/>
+            </a:ln>
+          </p:spPr>
+          <p:style>
+            <a:lnRef idx="1">
+              <a:schemeClr val="dk1"/>
+            </a:lnRef>
+            <a:fillRef idx="0">
+              <a:schemeClr val="dk1"/>
+            </a:fillRef>
+            <a:effectRef idx="0">
+              <a:schemeClr val="dk1"/>
+            </a:effectRef>
+            <a:fontRef idx="minor">
+              <a:schemeClr val="tx1"/>
+            </a:fontRef>
+          </p:style>
+        </p:cxnSp>
+        <p:cxnSp>
+          <p:nvCxnSpPr>
+            <p:cNvPr id="13" name="直接箭头连接符 12">
+              <a:extLst>
+                <a:ext uri="{FF2B5EF4-FFF2-40B4-BE49-F238E27FC236}">
+                  <a16:creationId xmlns:a16="http://schemas.microsoft.com/office/drawing/2014/main" id="{16701F89-856D-41A2-A17B-88C1C431F0C7}"/>
+                </a:ext>
+              </a:extLst>
+            </p:cNvPr>
+            <p:cNvCxnSpPr>
+              <a:cxnSpLocks/>
+              <a:stCxn id="6" idx="2"/>
+              <a:endCxn id="7" idx="0"/>
+            </p:cNvCxnSpPr>
+            <p:nvPr/>
+          </p:nvCxnSpPr>
+          <p:spPr>
+            <a:xfrm flipH="1">
+              <a:off x="8906636" y="3000076"/>
+              <a:ext cx="514688" cy="600798"/>
+            </a:xfrm>
+            <a:prstGeom prst="straightConnector1">
+              <a:avLst/>
+            </a:prstGeom>
+            <a:ln w="44450">
+              <a:solidFill>
+                <a:srgbClr val="0000CC"/>
+              </a:solidFill>
+              <a:prstDash val="sysDash"/>
+              <a:tailEnd type="triangle"/>
+            </a:ln>
+          </p:spPr>
+          <p:style>
+            <a:lnRef idx="1">
+              <a:schemeClr val="dk1"/>
+            </a:lnRef>
+            <a:fillRef idx="0">
+              <a:schemeClr val="dk1"/>
+            </a:fillRef>
+            <a:effectRef idx="0">
+              <a:schemeClr val="dk1"/>
+            </a:effectRef>
+            <a:fontRef idx="minor">
+              <a:schemeClr val="tx1"/>
+            </a:fontRef>
+          </p:style>
+        </p:cxnSp>
+        <p:cxnSp>
+          <p:nvCxnSpPr>
+            <p:cNvPr id="14" name="直接箭头连接符 13">
+              <a:extLst>
+                <a:ext uri="{FF2B5EF4-FFF2-40B4-BE49-F238E27FC236}">
+                  <a16:creationId xmlns:a16="http://schemas.microsoft.com/office/drawing/2014/main" id="{BF391BB1-97E3-45B6-A215-137C809D55CB}"/>
+                </a:ext>
+              </a:extLst>
+            </p:cNvPr>
+            <p:cNvCxnSpPr>
+              <a:cxnSpLocks/>
+              <a:stCxn id="5" idx="2"/>
+              <a:endCxn id="22" idx="0"/>
+            </p:cNvCxnSpPr>
+            <p:nvPr/>
+          </p:nvCxnSpPr>
+          <p:spPr>
+            <a:xfrm>
+              <a:off x="9424035" y="1317308"/>
+              <a:ext cx="1943710" cy="3511145"/>
+            </a:xfrm>
+            <a:prstGeom prst="straightConnector1">
+              <a:avLst/>
+            </a:prstGeom>
+            <a:ln w="44450">
+              <a:solidFill>
+                <a:schemeClr val="accent4">
+                  <a:lumMod val="75000"/>
+                </a:schemeClr>
+              </a:solidFill>
+              <a:prstDash val="sysDot"/>
+              <a:tailEnd type="triangle"/>
+            </a:ln>
+          </p:spPr>
+          <p:style>
+            <a:lnRef idx="1">
+              <a:schemeClr val="dk1"/>
+            </a:lnRef>
+            <a:fillRef idx="0">
+              <a:schemeClr val="dk1"/>
+            </a:fillRef>
+            <a:effectRef idx="0">
+              <a:schemeClr val="dk1"/>
+            </a:effectRef>
+            <a:fontRef idx="minor">
+              <a:schemeClr val="tx1"/>
+            </a:fontRef>
+          </p:style>
+        </p:cxnSp>
+        <p:sp>
+          <p:nvSpPr>
+            <p:cNvPr id="26" name="矩形 25">
+              <a:extLst>
+                <a:ext uri="{FF2B5EF4-FFF2-40B4-BE49-F238E27FC236}">
+                  <a16:creationId xmlns:a16="http://schemas.microsoft.com/office/drawing/2014/main" id="{9B9D38A8-5C79-461A-AF90-92A127743DDB}"/>
+                </a:ext>
+              </a:extLst>
+            </p:cNvPr>
+            <p:cNvSpPr/>
+            <p:nvPr/>
+          </p:nvSpPr>
+          <p:spPr>
+            <a:xfrm>
+              <a:off x="9869325" y="2018723"/>
+              <a:ext cx="374749" cy="369332"/>
+            </a:xfrm>
+            <a:prstGeom prst="rect">
+              <a:avLst/>
+            </a:prstGeom>
+          </p:spPr>
+          <p:txBody>
+            <a:bodyPr wrap="square">
+              <a:spAutoFit/>
+            </a:bodyPr>
+            <a:lstStyle/>
+            <a:p>
+              <a:pPr algn="ctr"/>
+              <a:r>
+                <a:rPr lang="en-US" altLang="zh-CN" b="1" dirty="0">
+                  <a:solidFill>
+                    <a:schemeClr val="accent4">
+                      <a:lumMod val="75000"/>
+                    </a:schemeClr>
+                  </a:solidFill>
+                  <a:latin typeface="Arial" panose="020B0604020202020204" pitchFamily="34" charset="0"/>
+                  <a:cs typeface="Arial" panose="020B0604020202020204" pitchFamily="34" charset="0"/>
+                </a:rPr>
+                <a:t>5</a:t>
+              </a:r>
+              <a:endParaRPr lang="zh-CN" altLang="en-US" b="1" dirty="0">
                 <a:solidFill>
                   <a:schemeClr val="accent4">
                     <a:lumMod val="75000"/>
@@ -13650,828 +12674,860 @@
                 </a:solidFill>
                 <a:latin typeface="Arial" panose="020B0604020202020204" pitchFamily="34" charset="0"/>
                 <a:cs typeface="Arial" panose="020B0604020202020204" pitchFamily="34" charset="0"/>
-              </a:rPr>
-              <a:t>5</a:t>
-            </a:r>
-            <a:endParaRPr lang="zh-CN" altLang="en-US" b="1" dirty="0">
-              <a:solidFill>
-                <a:schemeClr val="accent4">
-                  <a:lumMod val="75000"/>
-                </a:schemeClr>
-              </a:solidFill>
-              <a:latin typeface="Arial" panose="020B0604020202020204" pitchFamily="34" charset="0"/>
-              <a:cs typeface="Arial" panose="020B0604020202020204" pitchFamily="34" charset="0"/>
-            </a:endParaRPr>
-          </a:p>
-        </p:txBody>
-      </p:sp>
-      <p:sp>
-        <p:nvSpPr>
-          <p:cNvPr id="27" name="矩形 26">
-            <a:extLst>
-              <a:ext uri="{FF2B5EF4-FFF2-40B4-BE49-F238E27FC236}">
-                <a16:creationId xmlns:a16="http://schemas.microsoft.com/office/drawing/2014/main" id="{547828B9-BA0D-4471-8B1D-B7A86DE2A49C}"/>
-              </a:ext>
-            </a:extLst>
-          </p:cNvPr>
-          <p:cNvSpPr/>
-          <p:nvPr/>
-        </p:nvSpPr>
-        <p:spPr>
-          <a:xfrm>
-            <a:off x="10599330" y="2733850"/>
-            <a:ext cx="300082" cy="369332"/>
-          </a:xfrm>
-          <a:prstGeom prst="rect">
-            <a:avLst/>
-          </a:prstGeom>
-        </p:spPr>
-        <p:txBody>
-          <a:bodyPr wrap="none">
-            <a:spAutoFit/>
-          </a:bodyPr>
-          <a:lstStyle/>
-          <a:p>
-            <a:pPr algn="ctr"/>
-            <a:r>
-              <a:rPr lang="en-US" altLang="zh-CN" b="1" dirty="0">
+              </a:endParaRPr>
+            </a:p>
+          </p:txBody>
+        </p:sp>
+        <p:sp>
+          <p:nvSpPr>
+            <p:cNvPr id="27" name="矩形 26">
+              <a:extLst>
+                <a:ext uri="{FF2B5EF4-FFF2-40B4-BE49-F238E27FC236}">
+                  <a16:creationId xmlns:a16="http://schemas.microsoft.com/office/drawing/2014/main" id="{547828B9-BA0D-4471-8B1D-B7A86DE2A49C}"/>
+                </a:ext>
+              </a:extLst>
+            </p:cNvPr>
+            <p:cNvSpPr/>
+            <p:nvPr/>
+          </p:nvSpPr>
+          <p:spPr>
+            <a:xfrm>
+              <a:off x="10599330" y="2733850"/>
+              <a:ext cx="300082" cy="369332"/>
+            </a:xfrm>
+            <a:prstGeom prst="rect">
+              <a:avLst/>
+            </a:prstGeom>
+          </p:spPr>
+          <p:txBody>
+            <a:bodyPr wrap="none">
+              <a:spAutoFit/>
+            </a:bodyPr>
+            <a:lstStyle/>
+            <a:p>
+              <a:pPr algn="ctr"/>
+              <a:r>
+                <a:rPr lang="en-US" altLang="zh-CN" b="1" dirty="0">
+                  <a:solidFill>
+                    <a:srgbClr val="0099CC"/>
+                  </a:solidFill>
+                  <a:latin typeface="Times New Roman" panose="02020603050405020304" pitchFamily="18" charset="0"/>
+                  <a:cs typeface="Times New Roman" panose="02020603050405020304" pitchFamily="18" charset="0"/>
+                </a:rPr>
+                <a:t>6</a:t>
+              </a:r>
+              <a:endParaRPr lang="zh-CN" altLang="en-US" b="1" dirty="0">
                 <a:solidFill>
                   <a:srgbClr val="0099CC"/>
                 </a:solidFill>
                 <a:latin typeface="Times New Roman" panose="02020603050405020304" pitchFamily="18" charset="0"/>
                 <a:cs typeface="Times New Roman" panose="02020603050405020304" pitchFamily="18" charset="0"/>
-              </a:rPr>
-              <a:t>6</a:t>
-            </a:r>
-            <a:endParaRPr lang="zh-CN" altLang="en-US" b="1" dirty="0">
-              <a:solidFill>
-                <a:srgbClr val="0099CC"/>
-              </a:solidFill>
-              <a:latin typeface="Times New Roman" panose="02020603050405020304" pitchFamily="18" charset="0"/>
-              <a:cs typeface="Times New Roman" panose="02020603050405020304" pitchFamily="18" charset="0"/>
-            </a:endParaRPr>
-          </a:p>
-        </p:txBody>
-      </p:sp>
-      <p:sp>
-        <p:nvSpPr>
-          <p:cNvPr id="28" name="矩形 27">
-            <a:extLst>
-              <a:ext uri="{FF2B5EF4-FFF2-40B4-BE49-F238E27FC236}">
-                <a16:creationId xmlns:a16="http://schemas.microsoft.com/office/drawing/2014/main" id="{191D5225-806E-49CB-807C-D002C070F822}"/>
-              </a:ext>
-            </a:extLst>
-          </p:cNvPr>
-          <p:cNvSpPr/>
-          <p:nvPr/>
-        </p:nvSpPr>
-        <p:spPr>
-          <a:xfrm>
-            <a:off x="8878115" y="3029382"/>
-            <a:ext cx="300082" cy="369332"/>
-          </a:xfrm>
-          <a:prstGeom prst="rect">
-            <a:avLst/>
-          </a:prstGeom>
-        </p:spPr>
-        <p:txBody>
-          <a:bodyPr wrap="none">
-            <a:spAutoFit/>
-          </a:bodyPr>
-          <a:lstStyle/>
-          <a:p>
-            <a:pPr algn="ctr"/>
-            <a:r>
-              <a:rPr lang="en-US" altLang="zh-CN" b="1" dirty="0">
+              </a:endParaRPr>
+            </a:p>
+          </p:txBody>
+        </p:sp>
+        <p:sp>
+          <p:nvSpPr>
+            <p:cNvPr id="28" name="矩形 27">
+              <a:extLst>
+                <a:ext uri="{FF2B5EF4-FFF2-40B4-BE49-F238E27FC236}">
+                  <a16:creationId xmlns:a16="http://schemas.microsoft.com/office/drawing/2014/main" id="{191D5225-806E-49CB-807C-D002C070F822}"/>
+                </a:ext>
+              </a:extLst>
+            </p:cNvPr>
+            <p:cNvSpPr/>
+            <p:nvPr/>
+          </p:nvSpPr>
+          <p:spPr>
+            <a:xfrm>
+              <a:off x="8878115" y="3029382"/>
+              <a:ext cx="300082" cy="369332"/>
+            </a:xfrm>
+            <a:prstGeom prst="rect">
+              <a:avLst/>
+            </a:prstGeom>
+          </p:spPr>
+          <p:txBody>
+            <a:bodyPr wrap="none">
+              <a:spAutoFit/>
+            </a:bodyPr>
+            <a:lstStyle/>
+            <a:p>
+              <a:pPr algn="ctr"/>
+              <a:r>
+                <a:rPr lang="en-US" altLang="zh-CN" b="1" dirty="0">
+                  <a:solidFill>
+                    <a:srgbClr val="0000CC"/>
+                  </a:solidFill>
+                  <a:latin typeface="Times New Roman" panose="02020603050405020304" pitchFamily="18" charset="0"/>
+                  <a:cs typeface="Times New Roman" panose="02020603050405020304" pitchFamily="18" charset="0"/>
+                </a:rPr>
+                <a:t>4</a:t>
+              </a:r>
+              <a:endParaRPr lang="zh-CN" altLang="en-US" b="1" dirty="0">
                 <a:solidFill>
                   <a:srgbClr val="0000CC"/>
                 </a:solidFill>
                 <a:latin typeface="Times New Roman" panose="02020603050405020304" pitchFamily="18" charset="0"/>
                 <a:cs typeface="Times New Roman" panose="02020603050405020304" pitchFamily="18" charset="0"/>
-              </a:rPr>
-              <a:t>4</a:t>
-            </a:r>
-            <a:endParaRPr lang="zh-CN" altLang="en-US" b="1" dirty="0">
-              <a:solidFill>
-                <a:srgbClr val="0000CC"/>
-              </a:solidFill>
-              <a:latin typeface="Times New Roman" panose="02020603050405020304" pitchFamily="18" charset="0"/>
-              <a:cs typeface="Times New Roman" panose="02020603050405020304" pitchFamily="18" charset="0"/>
-            </a:endParaRPr>
-          </a:p>
-        </p:txBody>
-      </p:sp>
-      <p:sp>
-        <p:nvSpPr>
-          <p:cNvPr id="30" name="矩形 29">
-            <a:extLst>
-              <a:ext uri="{FF2B5EF4-FFF2-40B4-BE49-F238E27FC236}">
-                <a16:creationId xmlns:a16="http://schemas.microsoft.com/office/drawing/2014/main" id="{6AC13B46-6178-4461-85F3-72378078B9C6}"/>
-              </a:ext>
-            </a:extLst>
-          </p:cNvPr>
-          <p:cNvSpPr/>
-          <p:nvPr/>
-        </p:nvSpPr>
-        <p:spPr>
-          <a:xfrm>
-            <a:off x="8813902" y="1731454"/>
-            <a:ext cx="312907" cy="369332"/>
-          </a:xfrm>
-          <a:prstGeom prst="rect">
-            <a:avLst/>
-          </a:prstGeom>
-        </p:spPr>
-        <p:txBody>
-          <a:bodyPr wrap="none">
-            <a:spAutoFit/>
-          </a:bodyPr>
-          <a:lstStyle/>
-          <a:p>
-            <a:pPr algn="ctr"/>
-            <a:r>
-              <a:rPr lang="en-US" altLang="zh-CN" b="1" dirty="0">
+              </a:endParaRPr>
+            </a:p>
+          </p:txBody>
+        </p:sp>
+        <p:sp>
+          <p:nvSpPr>
+            <p:cNvPr id="30" name="矩形 29">
+              <a:extLst>
+                <a:ext uri="{FF2B5EF4-FFF2-40B4-BE49-F238E27FC236}">
+                  <a16:creationId xmlns:a16="http://schemas.microsoft.com/office/drawing/2014/main" id="{6AC13B46-6178-4461-85F3-72378078B9C6}"/>
+                </a:ext>
+              </a:extLst>
+            </p:cNvPr>
+            <p:cNvSpPr/>
+            <p:nvPr/>
+          </p:nvSpPr>
+          <p:spPr>
+            <a:xfrm>
+              <a:off x="8813902" y="1731454"/>
+              <a:ext cx="312907" cy="369332"/>
+            </a:xfrm>
+            <a:prstGeom prst="rect">
+              <a:avLst/>
+            </a:prstGeom>
+          </p:spPr>
+          <p:txBody>
+            <a:bodyPr wrap="none">
+              <a:spAutoFit/>
+            </a:bodyPr>
+            <a:lstStyle/>
+            <a:p>
+              <a:pPr algn="ctr"/>
+              <a:r>
+                <a:rPr lang="en-US" altLang="zh-CN" b="1" dirty="0">
+                  <a:solidFill>
+                    <a:srgbClr val="7030A0"/>
+                  </a:solidFill>
+                  <a:latin typeface="Arial" panose="020B0604020202020204" pitchFamily="34" charset="0"/>
+                  <a:cs typeface="Arial" panose="020B0604020202020204" pitchFamily="34" charset="0"/>
+                </a:rPr>
+                <a:t>2</a:t>
+              </a:r>
+              <a:endParaRPr lang="zh-CN" altLang="en-US" b="1" dirty="0">
                 <a:solidFill>
                   <a:srgbClr val="7030A0"/>
                 </a:solidFill>
                 <a:latin typeface="Arial" panose="020B0604020202020204" pitchFamily="34" charset="0"/>
                 <a:cs typeface="Arial" panose="020B0604020202020204" pitchFamily="34" charset="0"/>
-              </a:rPr>
-              <a:t>2</a:t>
-            </a:r>
-            <a:endParaRPr lang="zh-CN" altLang="en-US" b="1" dirty="0">
+              </a:endParaRPr>
+            </a:p>
+          </p:txBody>
+        </p:sp>
+        <p:sp>
+          <p:nvSpPr>
+            <p:cNvPr id="21" name="矩形 20">
+              <a:extLst>
+                <a:ext uri="{FF2B5EF4-FFF2-40B4-BE49-F238E27FC236}">
+                  <a16:creationId xmlns:a16="http://schemas.microsoft.com/office/drawing/2014/main" id="{8669C03D-7BED-493E-981B-16B0E74278EA}"/>
+                </a:ext>
+              </a:extLst>
+            </p:cNvPr>
+            <p:cNvSpPr/>
+            <p:nvPr/>
+          </p:nvSpPr>
+          <p:spPr>
+            <a:xfrm>
+              <a:off x="9890211" y="4828453"/>
+              <a:ext cx="678180" cy="388620"/>
+            </a:xfrm>
+            <a:prstGeom prst="rect">
+              <a:avLst/>
+            </a:prstGeom>
+            <a:noFill/>
+            <a:ln w="38100"/>
+          </p:spPr>
+          <p:style>
+            <a:lnRef idx="2">
+              <a:schemeClr val="dk1">
+                <a:shade val="50000"/>
+              </a:schemeClr>
+            </a:lnRef>
+            <a:fillRef idx="1">
+              <a:schemeClr val="dk1"/>
+            </a:fillRef>
+            <a:effectRef idx="0">
+              <a:schemeClr val="dk1"/>
+            </a:effectRef>
+            <a:fontRef idx="minor">
+              <a:schemeClr val="lt1"/>
+            </a:fontRef>
+          </p:style>
+          <p:txBody>
+            <a:bodyPr rtlCol="0" anchor="ctr"/>
+            <a:lstStyle/>
+            <a:p>
+              <a:pPr algn="ctr"/>
+              <a:r>
+                <a:rPr lang="en-US" altLang="zh-CN" b="1" dirty="0">
+                  <a:solidFill>
+                    <a:schemeClr val="tx1"/>
+                  </a:solidFill>
+                  <a:latin typeface="Arial" panose="020B0604020202020204" pitchFamily="34" charset="0"/>
+                  <a:cs typeface="Arial" panose="020B0604020202020204" pitchFamily="34" charset="0"/>
+                </a:rPr>
+                <a:t>5</a:t>
+              </a:r>
+              <a:endParaRPr lang="zh-CN" altLang="en-US" b="1" dirty="0">
+                <a:solidFill>
+                  <a:schemeClr val="tx1"/>
+                </a:solidFill>
+                <a:latin typeface="Arial" panose="020B0604020202020204" pitchFamily="34" charset="0"/>
+                <a:cs typeface="Arial" panose="020B0604020202020204" pitchFamily="34" charset="0"/>
+              </a:endParaRPr>
+            </a:p>
+          </p:txBody>
+        </p:sp>
+        <p:sp>
+          <p:nvSpPr>
+            <p:cNvPr id="22" name="矩形 21">
+              <a:extLst>
+                <a:ext uri="{FF2B5EF4-FFF2-40B4-BE49-F238E27FC236}">
+                  <a16:creationId xmlns:a16="http://schemas.microsoft.com/office/drawing/2014/main" id="{B28F6A6F-0B92-4B4A-976F-C1DD193368F3}"/>
+                </a:ext>
+              </a:extLst>
+            </p:cNvPr>
+            <p:cNvSpPr/>
+            <p:nvPr/>
+          </p:nvSpPr>
+          <p:spPr>
+            <a:xfrm>
+              <a:off x="11028655" y="4828453"/>
+              <a:ext cx="678180" cy="388620"/>
+            </a:xfrm>
+            <a:prstGeom prst="rect">
+              <a:avLst/>
+            </a:prstGeom>
+            <a:noFill/>
+            <a:ln w="38100"/>
+          </p:spPr>
+          <p:style>
+            <a:lnRef idx="2">
+              <a:schemeClr val="dk1">
+                <a:shade val="50000"/>
+              </a:schemeClr>
+            </a:lnRef>
+            <a:fillRef idx="1">
+              <a:schemeClr val="dk1"/>
+            </a:fillRef>
+            <a:effectRef idx="0">
+              <a:schemeClr val="dk1"/>
+            </a:effectRef>
+            <a:fontRef idx="minor">
+              <a:schemeClr val="lt1"/>
+            </a:fontRef>
+          </p:style>
+          <p:txBody>
+            <a:bodyPr rtlCol="0" anchor="ctr"/>
+            <a:lstStyle/>
+            <a:p>
+              <a:pPr algn="ctr"/>
+              <a:r>
+                <a:rPr lang="en-US" altLang="zh-CN" b="1" dirty="0">
+                  <a:solidFill>
+                    <a:schemeClr val="tx1"/>
+                  </a:solidFill>
+                  <a:latin typeface="Arial" panose="020B0604020202020204" pitchFamily="34" charset="0"/>
+                  <a:cs typeface="Arial" panose="020B0604020202020204" pitchFamily="34" charset="0"/>
+                </a:rPr>
+                <a:t>6</a:t>
+              </a:r>
+              <a:endParaRPr lang="zh-CN" altLang="en-US" b="1" dirty="0">
+                <a:solidFill>
+                  <a:schemeClr val="tx1"/>
+                </a:solidFill>
+                <a:latin typeface="Arial" panose="020B0604020202020204" pitchFamily="34" charset="0"/>
+                <a:cs typeface="Arial" panose="020B0604020202020204" pitchFamily="34" charset="0"/>
+              </a:endParaRPr>
+            </a:p>
+          </p:txBody>
+        </p:sp>
+        <p:sp>
+          <p:nvSpPr>
+            <p:cNvPr id="23" name="矩形 22">
+              <a:extLst>
+                <a:ext uri="{FF2B5EF4-FFF2-40B4-BE49-F238E27FC236}">
+                  <a16:creationId xmlns:a16="http://schemas.microsoft.com/office/drawing/2014/main" id="{36F31BB5-A7B4-4B6B-BA2B-7E4B6D0A6A4B}"/>
+                </a:ext>
+              </a:extLst>
+            </p:cNvPr>
+            <p:cNvSpPr/>
+            <p:nvPr/>
+          </p:nvSpPr>
+          <p:spPr>
+            <a:xfrm>
+              <a:off x="9849860" y="5984669"/>
+              <a:ext cx="678180" cy="388620"/>
+            </a:xfrm>
+            <a:prstGeom prst="rect">
+              <a:avLst/>
+            </a:prstGeom>
+            <a:noFill/>
+            <a:ln w="38100"/>
+          </p:spPr>
+          <p:style>
+            <a:lnRef idx="2">
+              <a:schemeClr val="dk1">
+                <a:shade val="50000"/>
+              </a:schemeClr>
+            </a:lnRef>
+            <a:fillRef idx="1">
+              <a:schemeClr val="dk1"/>
+            </a:fillRef>
+            <a:effectRef idx="0">
+              <a:schemeClr val="dk1"/>
+            </a:effectRef>
+            <a:fontRef idx="minor">
+              <a:schemeClr val="lt1"/>
+            </a:fontRef>
+          </p:style>
+          <p:txBody>
+            <a:bodyPr rtlCol="0" anchor="ctr"/>
+            <a:lstStyle/>
+            <a:p>
+              <a:pPr algn="ctr"/>
+              <a:r>
+                <a:rPr lang="en-US" altLang="zh-CN" b="1" dirty="0">
+                  <a:solidFill>
+                    <a:schemeClr val="tx1"/>
+                  </a:solidFill>
+                  <a:latin typeface="Arial" panose="020B0604020202020204" pitchFamily="34" charset="0"/>
+                  <a:cs typeface="Arial" panose="020B0604020202020204" pitchFamily="34" charset="0"/>
+                </a:rPr>
+                <a:t>7</a:t>
+              </a:r>
+              <a:endParaRPr lang="zh-CN" altLang="en-US" b="1" dirty="0">
+                <a:solidFill>
+                  <a:schemeClr val="tx1"/>
+                </a:solidFill>
+                <a:latin typeface="Arial" panose="020B0604020202020204" pitchFamily="34" charset="0"/>
+                <a:cs typeface="Arial" panose="020B0604020202020204" pitchFamily="34" charset="0"/>
+              </a:endParaRPr>
+            </a:p>
+          </p:txBody>
+        </p:sp>
+        <p:cxnSp>
+          <p:nvCxnSpPr>
+            <p:cNvPr id="37" name="直接箭头连接符 36">
+              <a:extLst>
+                <a:ext uri="{FF2B5EF4-FFF2-40B4-BE49-F238E27FC236}">
+                  <a16:creationId xmlns:a16="http://schemas.microsoft.com/office/drawing/2014/main" id="{85FF7EAC-4345-4162-864A-07839F9B249A}"/>
+                </a:ext>
+              </a:extLst>
+            </p:cNvPr>
+            <p:cNvCxnSpPr>
+              <a:cxnSpLocks/>
+              <a:stCxn id="8" idx="2"/>
+              <a:endCxn id="23" idx="0"/>
+            </p:cNvCxnSpPr>
+            <p:nvPr/>
+          </p:nvCxnSpPr>
+          <p:spPr>
+            <a:xfrm>
+              <a:off x="8887075" y="5183892"/>
+              <a:ext cx="1301875" cy="800777"/>
+            </a:xfrm>
+            <a:prstGeom prst="straightConnector1">
+              <a:avLst/>
+            </a:prstGeom>
+            <a:ln w="44450">
               <a:solidFill>
-                <a:srgbClr val="7030A0"/>
+                <a:schemeClr val="accent1"/>
               </a:solidFill>
-              <a:latin typeface="Arial" panose="020B0604020202020204" pitchFamily="34" charset="0"/>
-              <a:cs typeface="Arial" panose="020B0604020202020204" pitchFamily="34" charset="0"/>
-            </a:endParaRPr>
-          </a:p>
-        </p:txBody>
-      </p:sp>
+              <a:prstDash val="sysDot"/>
+              <a:tailEnd type="triangle"/>
+            </a:ln>
+          </p:spPr>
+          <p:style>
+            <a:lnRef idx="1">
+              <a:schemeClr val="dk1"/>
+            </a:lnRef>
+            <a:fillRef idx="0">
+              <a:schemeClr val="dk1"/>
+            </a:fillRef>
+            <a:effectRef idx="0">
+              <a:schemeClr val="dk1"/>
+            </a:effectRef>
+            <a:fontRef idx="minor">
+              <a:schemeClr val="tx1"/>
+            </a:fontRef>
+          </p:style>
+        </p:cxnSp>
+        <p:cxnSp>
+          <p:nvCxnSpPr>
+            <p:cNvPr id="40" name="直接箭头连接符 39">
+              <a:extLst>
+                <a:ext uri="{FF2B5EF4-FFF2-40B4-BE49-F238E27FC236}">
+                  <a16:creationId xmlns:a16="http://schemas.microsoft.com/office/drawing/2014/main" id="{977FAEEB-D91D-4FB9-94F6-5495459283ED}"/>
+                </a:ext>
+              </a:extLst>
+            </p:cNvPr>
+            <p:cNvCxnSpPr>
+              <a:cxnSpLocks/>
+              <a:stCxn id="22" idx="2"/>
+              <a:endCxn id="23" idx="0"/>
+            </p:cNvCxnSpPr>
+            <p:nvPr/>
+          </p:nvCxnSpPr>
+          <p:spPr>
+            <a:xfrm flipH="1">
+              <a:off x="10188950" y="5217073"/>
+              <a:ext cx="1178795" cy="767596"/>
+            </a:xfrm>
+            <a:prstGeom prst="straightConnector1">
+              <a:avLst/>
+            </a:prstGeom>
+            <a:ln w="44450">
+              <a:solidFill>
+                <a:schemeClr val="accent1"/>
+              </a:solidFill>
+              <a:prstDash val="sysDot"/>
+              <a:tailEnd type="triangle"/>
+            </a:ln>
+          </p:spPr>
+          <p:style>
+            <a:lnRef idx="1">
+              <a:schemeClr val="dk1"/>
+            </a:lnRef>
+            <a:fillRef idx="0">
+              <a:schemeClr val="dk1"/>
+            </a:fillRef>
+            <a:effectRef idx="0">
+              <a:schemeClr val="dk1"/>
+            </a:effectRef>
+            <a:fontRef idx="minor">
+              <a:schemeClr val="tx1"/>
+            </a:fontRef>
+          </p:style>
+        </p:cxnSp>
+        <p:cxnSp>
+          <p:nvCxnSpPr>
+            <p:cNvPr id="43" name="直接箭头连接符 42">
+              <a:extLst>
+                <a:ext uri="{FF2B5EF4-FFF2-40B4-BE49-F238E27FC236}">
+                  <a16:creationId xmlns:a16="http://schemas.microsoft.com/office/drawing/2014/main" id="{BBBE7C4D-2784-46E8-8D64-0980613A8533}"/>
+                </a:ext>
+              </a:extLst>
+            </p:cNvPr>
+            <p:cNvCxnSpPr>
+              <a:cxnSpLocks/>
+              <a:stCxn id="21" idx="2"/>
+              <a:endCxn id="23" idx="0"/>
+            </p:cNvCxnSpPr>
+            <p:nvPr/>
+          </p:nvCxnSpPr>
+          <p:spPr>
+            <a:xfrm flipH="1">
+              <a:off x="10188950" y="5217073"/>
+              <a:ext cx="40351" cy="767596"/>
+            </a:xfrm>
+            <a:prstGeom prst="straightConnector1">
+              <a:avLst/>
+            </a:prstGeom>
+            <a:ln w="44450">
+              <a:solidFill>
+                <a:schemeClr val="accent1"/>
+              </a:solidFill>
+              <a:prstDash val="sysDot"/>
+              <a:tailEnd type="triangle"/>
+            </a:ln>
+          </p:spPr>
+          <p:style>
+            <a:lnRef idx="1">
+              <a:schemeClr val="dk1"/>
+            </a:lnRef>
+            <a:fillRef idx="0">
+              <a:schemeClr val="dk1"/>
+            </a:fillRef>
+            <a:effectRef idx="0">
+              <a:schemeClr val="dk1"/>
+            </a:effectRef>
+            <a:fontRef idx="minor">
+              <a:schemeClr val="tx1"/>
+            </a:fontRef>
+          </p:style>
+        </p:cxnSp>
+        <p:sp>
+          <p:nvSpPr>
+            <p:cNvPr id="46" name="矩形 45">
+              <a:extLst>
+                <a:ext uri="{FF2B5EF4-FFF2-40B4-BE49-F238E27FC236}">
+                  <a16:creationId xmlns:a16="http://schemas.microsoft.com/office/drawing/2014/main" id="{07463793-DC08-4949-9BCB-AFB460B23A1F}"/>
+                </a:ext>
+              </a:extLst>
+            </p:cNvPr>
+            <p:cNvSpPr/>
+            <p:nvPr/>
+          </p:nvSpPr>
+          <p:spPr>
+            <a:xfrm>
+              <a:off x="9047857" y="5383502"/>
+              <a:ext cx="312907" cy="369332"/>
+            </a:xfrm>
+            <a:prstGeom prst="rect">
+              <a:avLst/>
+            </a:prstGeom>
+          </p:spPr>
+          <p:txBody>
+            <a:bodyPr wrap="square">
+              <a:spAutoFit/>
+            </a:bodyPr>
+            <a:lstStyle/>
+            <a:p>
+              <a:pPr algn="ctr"/>
+              <a:r>
+                <a:rPr lang="en-US" altLang="zh-CN" b="1" dirty="0">
+                  <a:solidFill>
+                    <a:schemeClr val="accent1"/>
+                  </a:solidFill>
+                  <a:latin typeface="Arial" panose="020B0604020202020204" pitchFamily="34" charset="0"/>
+                  <a:cs typeface="Arial" panose="020B0604020202020204" pitchFamily="34" charset="0"/>
+                </a:rPr>
+                <a:t>1</a:t>
+              </a:r>
+              <a:endParaRPr lang="zh-CN" altLang="en-US" b="1" dirty="0">
+                <a:solidFill>
+                  <a:schemeClr val="accent1"/>
+                </a:solidFill>
+                <a:latin typeface="Arial" panose="020B0604020202020204" pitchFamily="34" charset="0"/>
+                <a:cs typeface="Arial" panose="020B0604020202020204" pitchFamily="34" charset="0"/>
+              </a:endParaRPr>
+            </a:p>
+          </p:txBody>
+        </p:sp>
+        <p:sp>
+          <p:nvSpPr>
+            <p:cNvPr id="47" name="矩形 46">
+              <a:extLst>
+                <a:ext uri="{FF2B5EF4-FFF2-40B4-BE49-F238E27FC236}">
+                  <a16:creationId xmlns:a16="http://schemas.microsoft.com/office/drawing/2014/main" id="{A08B1610-7D39-4190-9FBD-8667AC6CC43A}"/>
+                </a:ext>
+              </a:extLst>
+            </p:cNvPr>
+            <p:cNvSpPr/>
+            <p:nvPr/>
+          </p:nvSpPr>
+          <p:spPr>
+            <a:xfrm>
+              <a:off x="9890211" y="5411383"/>
+              <a:ext cx="312907" cy="369332"/>
+            </a:xfrm>
+            <a:prstGeom prst="rect">
+              <a:avLst/>
+            </a:prstGeom>
+          </p:spPr>
+          <p:txBody>
+            <a:bodyPr wrap="none">
+              <a:spAutoFit/>
+            </a:bodyPr>
+            <a:lstStyle/>
+            <a:p>
+              <a:pPr algn="ctr"/>
+              <a:r>
+                <a:rPr lang="en-US" altLang="zh-CN" b="1" dirty="0">
+                  <a:solidFill>
+                    <a:schemeClr val="accent1"/>
+                  </a:solidFill>
+                  <a:latin typeface="Arial" panose="020B0604020202020204" pitchFamily="34" charset="0"/>
+                  <a:cs typeface="Arial" panose="020B0604020202020204" pitchFamily="34" charset="0"/>
+                </a:rPr>
+                <a:t>1</a:t>
+              </a:r>
+              <a:endParaRPr lang="zh-CN" altLang="en-US" b="1" dirty="0">
+                <a:solidFill>
+                  <a:schemeClr val="accent1"/>
+                </a:solidFill>
+                <a:latin typeface="Arial" panose="020B0604020202020204" pitchFamily="34" charset="0"/>
+                <a:cs typeface="Arial" panose="020B0604020202020204" pitchFamily="34" charset="0"/>
+              </a:endParaRPr>
+            </a:p>
+          </p:txBody>
+        </p:sp>
+        <p:sp>
+          <p:nvSpPr>
+            <p:cNvPr id="48" name="矩形 47">
+              <a:extLst>
+                <a:ext uri="{FF2B5EF4-FFF2-40B4-BE49-F238E27FC236}">
+                  <a16:creationId xmlns:a16="http://schemas.microsoft.com/office/drawing/2014/main" id="{99EF1B13-F799-4AF3-9129-C44A22E46D3A}"/>
+                </a:ext>
+              </a:extLst>
+            </p:cNvPr>
+            <p:cNvSpPr/>
+            <p:nvPr/>
+          </p:nvSpPr>
+          <p:spPr>
+            <a:xfrm>
+              <a:off x="11035632" y="5478306"/>
+              <a:ext cx="312907" cy="369332"/>
+            </a:xfrm>
+            <a:prstGeom prst="rect">
+              <a:avLst/>
+            </a:prstGeom>
+          </p:spPr>
+          <p:txBody>
+            <a:bodyPr wrap="none">
+              <a:spAutoFit/>
+            </a:bodyPr>
+            <a:lstStyle/>
+            <a:p>
+              <a:pPr algn="ctr"/>
+              <a:r>
+                <a:rPr lang="en-US" altLang="zh-CN" b="1" dirty="0">
+                  <a:solidFill>
+                    <a:schemeClr val="accent1"/>
+                  </a:solidFill>
+                  <a:latin typeface="Arial" panose="020B0604020202020204" pitchFamily="34" charset="0"/>
+                  <a:cs typeface="Arial" panose="020B0604020202020204" pitchFamily="34" charset="0"/>
+                </a:rPr>
+                <a:t>1</a:t>
+              </a:r>
+              <a:endParaRPr lang="zh-CN" altLang="en-US" b="1" dirty="0">
+                <a:solidFill>
+                  <a:schemeClr val="accent1"/>
+                </a:solidFill>
+                <a:latin typeface="Arial" panose="020B0604020202020204" pitchFamily="34" charset="0"/>
+                <a:cs typeface="Arial" panose="020B0604020202020204" pitchFamily="34" charset="0"/>
+              </a:endParaRPr>
+            </a:p>
+          </p:txBody>
+        </p:sp>
+        <p:cxnSp>
+          <p:nvCxnSpPr>
+            <p:cNvPr id="60" name="直接箭头连接符 59">
+              <a:extLst>
+                <a:ext uri="{FF2B5EF4-FFF2-40B4-BE49-F238E27FC236}">
+                  <a16:creationId xmlns:a16="http://schemas.microsoft.com/office/drawing/2014/main" id="{C63BB01E-DB2E-42F1-BBA1-06643BCEF725}"/>
+                </a:ext>
+              </a:extLst>
+            </p:cNvPr>
+            <p:cNvCxnSpPr>
+              <a:cxnSpLocks/>
+              <a:stCxn id="7" idx="2"/>
+              <a:endCxn id="8" idx="0"/>
+            </p:cNvCxnSpPr>
+            <p:nvPr/>
+          </p:nvCxnSpPr>
+          <p:spPr>
+            <a:xfrm flipH="1">
+              <a:off x="8887075" y="3989494"/>
+              <a:ext cx="19561" cy="805778"/>
+            </a:xfrm>
+            <a:prstGeom prst="straightConnector1">
+              <a:avLst/>
+            </a:prstGeom>
+            <a:ln w="44450">
+              <a:solidFill>
+                <a:srgbClr val="0000CC"/>
+              </a:solidFill>
+              <a:prstDash val="sysDash"/>
+              <a:tailEnd type="triangle"/>
+            </a:ln>
+          </p:spPr>
+          <p:style>
+            <a:lnRef idx="1">
+              <a:schemeClr val="dk1"/>
+            </a:lnRef>
+            <a:fillRef idx="0">
+              <a:schemeClr val="dk1"/>
+            </a:fillRef>
+            <a:effectRef idx="0">
+              <a:schemeClr val="dk1"/>
+            </a:effectRef>
+            <a:fontRef idx="minor">
+              <a:schemeClr val="tx1"/>
+            </a:fontRef>
+          </p:style>
+        </p:cxnSp>
+        <p:sp>
+          <p:nvSpPr>
+            <p:cNvPr id="63" name="矩形 62">
+              <a:extLst>
+                <a:ext uri="{FF2B5EF4-FFF2-40B4-BE49-F238E27FC236}">
+                  <a16:creationId xmlns:a16="http://schemas.microsoft.com/office/drawing/2014/main" id="{9E635C6B-CAD1-4E9F-B301-8ED99689E95A}"/>
+                </a:ext>
+              </a:extLst>
+            </p:cNvPr>
+            <p:cNvSpPr/>
+            <p:nvPr/>
+          </p:nvSpPr>
+          <p:spPr>
+            <a:xfrm>
+              <a:off x="8596773" y="4050126"/>
+              <a:ext cx="300082" cy="369332"/>
+            </a:xfrm>
+            <a:prstGeom prst="rect">
+              <a:avLst/>
+            </a:prstGeom>
+          </p:spPr>
+          <p:txBody>
+            <a:bodyPr wrap="none">
+              <a:spAutoFit/>
+            </a:bodyPr>
+            <a:lstStyle/>
+            <a:p>
+              <a:pPr algn="ctr"/>
+              <a:r>
+                <a:rPr lang="en-US" altLang="zh-CN" b="1" dirty="0">
+                  <a:solidFill>
+                    <a:srgbClr val="0000CC"/>
+                  </a:solidFill>
+                  <a:latin typeface="Times New Roman" panose="02020603050405020304" pitchFamily="18" charset="0"/>
+                  <a:cs typeface="Times New Roman" panose="02020603050405020304" pitchFamily="18" charset="0"/>
+                </a:rPr>
+                <a:t>4</a:t>
+              </a:r>
+              <a:endParaRPr lang="zh-CN" altLang="en-US" b="1" dirty="0">
+                <a:solidFill>
+                  <a:srgbClr val="0000CC"/>
+                </a:solidFill>
+                <a:latin typeface="Times New Roman" panose="02020603050405020304" pitchFamily="18" charset="0"/>
+                <a:cs typeface="Times New Roman" panose="02020603050405020304" pitchFamily="18" charset="0"/>
+              </a:endParaRPr>
+            </a:p>
+          </p:txBody>
+        </p:sp>
+        <p:cxnSp>
+          <p:nvCxnSpPr>
+            <p:cNvPr id="66" name="直接箭头连接符 65">
+              <a:extLst>
+                <a:ext uri="{FF2B5EF4-FFF2-40B4-BE49-F238E27FC236}">
+                  <a16:creationId xmlns:a16="http://schemas.microsoft.com/office/drawing/2014/main" id="{12960518-2FEC-4A6A-A1B1-D7B25CE3494C}"/>
+                </a:ext>
+              </a:extLst>
+            </p:cNvPr>
+            <p:cNvCxnSpPr>
+              <a:cxnSpLocks/>
+              <a:stCxn id="6" idx="2"/>
+              <a:endCxn id="21" idx="0"/>
+            </p:cNvCxnSpPr>
+            <p:nvPr/>
+          </p:nvCxnSpPr>
+          <p:spPr>
+            <a:xfrm>
+              <a:off x="9421324" y="3000076"/>
+              <a:ext cx="807977" cy="1828377"/>
+            </a:xfrm>
+            <a:prstGeom prst="straightConnector1">
+              <a:avLst/>
+            </a:prstGeom>
+            <a:ln w="44450">
+              <a:solidFill>
+                <a:srgbClr val="0099CC"/>
+              </a:solidFill>
+              <a:prstDash val="sysDash"/>
+              <a:tailEnd type="triangle"/>
+            </a:ln>
+          </p:spPr>
+          <p:style>
+            <a:lnRef idx="1">
+              <a:schemeClr val="dk1"/>
+            </a:lnRef>
+            <a:fillRef idx="0">
+              <a:schemeClr val="dk1"/>
+            </a:fillRef>
+            <a:effectRef idx="0">
+              <a:schemeClr val="dk1"/>
+            </a:effectRef>
+            <a:fontRef idx="minor">
+              <a:schemeClr val="tx1"/>
+            </a:fontRef>
+          </p:style>
+        </p:cxnSp>
+        <p:sp>
+          <p:nvSpPr>
+            <p:cNvPr id="69" name="矩形 68">
+              <a:extLst>
+                <a:ext uri="{FF2B5EF4-FFF2-40B4-BE49-F238E27FC236}">
+                  <a16:creationId xmlns:a16="http://schemas.microsoft.com/office/drawing/2014/main" id="{753EEEB3-6130-4A4A-B4E7-A4144C1B9BC1}"/>
+                </a:ext>
+              </a:extLst>
+            </p:cNvPr>
+            <p:cNvSpPr/>
+            <p:nvPr/>
+          </p:nvSpPr>
+          <p:spPr>
+            <a:xfrm>
+              <a:off x="9828246" y="3548930"/>
+              <a:ext cx="300082" cy="369332"/>
+            </a:xfrm>
+            <a:prstGeom prst="rect">
+              <a:avLst/>
+            </a:prstGeom>
+          </p:spPr>
+          <p:txBody>
+            <a:bodyPr wrap="none">
+              <a:spAutoFit/>
+            </a:bodyPr>
+            <a:lstStyle/>
+            <a:p>
+              <a:pPr algn="ctr"/>
+              <a:r>
+                <a:rPr lang="en-US" altLang="zh-CN" b="1" dirty="0">
+                  <a:solidFill>
+                    <a:srgbClr val="0099CC"/>
+                  </a:solidFill>
+                  <a:latin typeface="Times New Roman" panose="02020603050405020304" pitchFamily="18" charset="0"/>
+                  <a:cs typeface="Times New Roman" panose="02020603050405020304" pitchFamily="18" charset="0"/>
+                </a:rPr>
+                <a:t>6</a:t>
+              </a:r>
+              <a:endParaRPr lang="zh-CN" altLang="en-US" b="1" dirty="0">
+                <a:solidFill>
+                  <a:srgbClr val="0099CC"/>
+                </a:solidFill>
+                <a:latin typeface="Times New Roman" panose="02020603050405020304" pitchFamily="18" charset="0"/>
+                <a:cs typeface="Times New Roman" panose="02020603050405020304" pitchFamily="18" charset="0"/>
+              </a:endParaRPr>
+            </a:p>
+          </p:txBody>
+        </p:sp>
+      </p:grpSp>
       <p:sp>
         <p:nvSpPr>
-          <p:cNvPr id="21" name="矩形 20">
-            <a:extLst>
-              <a:ext uri="{FF2B5EF4-FFF2-40B4-BE49-F238E27FC236}">
-                <a16:creationId xmlns:a16="http://schemas.microsoft.com/office/drawing/2014/main" id="{8669C03D-7BED-493E-981B-16B0E74278EA}"/>
-              </a:ext>
-            </a:extLst>
-          </p:cNvPr>
-          <p:cNvSpPr/>
+          <p:cNvPr id="11" name="文本框 10">
+            <a:extLst>
+              <a:ext uri="{FF2B5EF4-FFF2-40B4-BE49-F238E27FC236}">
+                <a16:creationId xmlns:a16="http://schemas.microsoft.com/office/drawing/2014/main" id="{94DC0C1D-7697-4DE1-A405-1CE7D5926F12}"/>
+              </a:ext>
+            </a:extLst>
+          </p:cNvPr>
+          <p:cNvSpPr txBox="1"/>
           <p:nvPr/>
         </p:nvSpPr>
         <p:spPr>
           <a:xfrm>
-            <a:off x="9890211" y="4828453"/>
-            <a:ext cx="678180" cy="388620"/>
+            <a:off x="838199" y="1689624"/>
+            <a:ext cx="4408317" cy="461665"/>
           </a:xfrm>
           <a:prstGeom prst="rect">
             <a:avLst/>
           </a:prstGeom>
           <a:noFill/>
-          <a:ln w="38100"/>
         </p:spPr>
-        <p:style>
-          <a:lnRef idx="2">
-            <a:schemeClr val="dk1">
-              <a:shade val="50000"/>
-            </a:schemeClr>
-          </a:lnRef>
-          <a:fillRef idx="1">
-            <a:schemeClr val="dk1"/>
-          </a:fillRef>
-          <a:effectRef idx="0">
-            <a:schemeClr val="dk1"/>
-          </a:effectRef>
-          <a:fontRef idx="minor">
-            <a:schemeClr val="lt1"/>
-          </a:fontRef>
-        </p:style>
         <p:txBody>
-          <a:bodyPr rtlCol="0" anchor="ctr"/>
+          <a:bodyPr wrap="square" rtlCol="0">
+            <a:spAutoFit/>
+          </a:bodyPr>
           <a:lstStyle/>
           <a:p>
-            <a:pPr algn="ctr"/>
-            <a:r>
-              <a:rPr lang="en-US" altLang="zh-CN" b="1" dirty="0">
-                <a:solidFill>
-                  <a:schemeClr val="tx1"/>
-                </a:solidFill>
+            <a:r>
+              <a:rPr lang="en-US" altLang="zh-CN" sz="2400" b="1" dirty="0">
                 <a:latin typeface="Arial" panose="020B0604020202020204" pitchFamily="34" charset="0"/>
                 <a:cs typeface="Arial" panose="020B0604020202020204" pitchFamily="34" charset="0"/>
               </a:rPr>
-              <a:t>5</a:t>
-            </a:r>
-            <a:endParaRPr lang="zh-CN" altLang="en-US" b="1" dirty="0">
-              <a:solidFill>
-                <a:schemeClr val="tx1"/>
-              </a:solidFill>
+              <a:t>70% accuracy on CIFAR-10</a:t>
+            </a:r>
+            <a:endParaRPr lang="zh-CN" altLang="en-US" sz="2400" b="1" dirty="0">
               <a:latin typeface="Arial" panose="020B0604020202020204" pitchFamily="34" charset="0"/>
               <a:cs typeface="Arial" panose="020B0604020202020204" pitchFamily="34" charset="0"/>
-            </a:endParaRPr>
-          </a:p>
-        </p:txBody>
-      </p:sp>
-      <p:sp>
-        <p:nvSpPr>
-          <p:cNvPr id="22" name="矩形 21">
-            <a:extLst>
-              <a:ext uri="{FF2B5EF4-FFF2-40B4-BE49-F238E27FC236}">
-                <a16:creationId xmlns:a16="http://schemas.microsoft.com/office/drawing/2014/main" id="{B28F6A6F-0B92-4B4A-976F-C1DD193368F3}"/>
-              </a:ext>
-            </a:extLst>
-          </p:cNvPr>
-          <p:cNvSpPr/>
-          <p:nvPr/>
-        </p:nvSpPr>
-        <p:spPr>
-          <a:xfrm>
-            <a:off x="11028655" y="4828453"/>
-            <a:ext cx="678180" cy="388620"/>
-          </a:xfrm>
-          <a:prstGeom prst="rect">
-            <a:avLst/>
-          </a:prstGeom>
-          <a:noFill/>
-          <a:ln w="38100"/>
-        </p:spPr>
-        <p:style>
-          <a:lnRef idx="2">
-            <a:schemeClr val="dk1">
-              <a:shade val="50000"/>
-            </a:schemeClr>
-          </a:lnRef>
-          <a:fillRef idx="1">
-            <a:schemeClr val="dk1"/>
-          </a:fillRef>
-          <a:effectRef idx="0">
-            <a:schemeClr val="dk1"/>
-          </a:effectRef>
-          <a:fontRef idx="minor">
-            <a:schemeClr val="lt1"/>
-          </a:fontRef>
-        </p:style>
-        <p:txBody>
-          <a:bodyPr rtlCol="0" anchor="ctr"/>
-          <a:lstStyle/>
-          <a:p>
-            <a:pPr algn="ctr"/>
-            <a:r>
-              <a:rPr lang="en-US" altLang="zh-CN" b="1" dirty="0">
-                <a:solidFill>
-                  <a:schemeClr val="tx1"/>
-                </a:solidFill>
-                <a:latin typeface="Arial" panose="020B0604020202020204" pitchFamily="34" charset="0"/>
-                <a:cs typeface="Arial" panose="020B0604020202020204" pitchFamily="34" charset="0"/>
-              </a:rPr>
-              <a:t>6</a:t>
-            </a:r>
-            <a:endParaRPr lang="zh-CN" altLang="en-US" b="1" dirty="0">
-              <a:solidFill>
-                <a:schemeClr val="tx1"/>
-              </a:solidFill>
-              <a:latin typeface="Arial" panose="020B0604020202020204" pitchFamily="34" charset="0"/>
-              <a:cs typeface="Arial" panose="020B0604020202020204" pitchFamily="34" charset="0"/>
-            </a:endParaRPr>
-          </a:p>
-        </p:txBody>
-      </p:sp>
-      <p:sp>
-        <p:nvSpPr>
-          <p:cNvPr id="23" name="矩形 22">
-            <a:extLst>
-              <a:ext uri="{FF2B5EF4-FFF2-40B4-BE49-F238E27FC236}">
-                <a16:creationId xmlns:a16="http://schemas.microsoft.com/office/drawing/2014/main" id="{36F31BB5-A7B4-4B6B-BA2B-7E4B6D0A6A4B}"/>
-              </a:ext>
-            </a:extLst>
-          </p:cNvPr>
-          <p:cNvSpPr/>
-          <p:nvPr/>
-        </p:nvSpPr>
-        <p:spPr>
-          <a:xfrm>
-            <a:off x="9849860" y="5984669"/>
-            <a:ext cx="678180" cy="388620"/>
-          </a:xfrm>
-          <a:prstGeom prst="rect">
-            <a:avLst/>
-          </a:prstGeom>
-          <a:noFill/>
-          <a:ln w="38100"/>
-        </p:spPr>
-        <p:style>
-          <a:lnRef idx="2">
-            <a:schemeClr val="dk1">
-              <a:shade val="50000"/>
-            </a:schemeClr>
-          </a:lnRef>
-          <a:fillRef idx="1">
-            <a:schemeClr val="dk1"/>
-          </a:fillRef>
-          <a:effectRef idx="0">
-            <a:schemeClr val="dk1"/>
-          </a:effectRef>
-          <a:fontRef idx="minor">
-            <a:schemeClr val="lt1"/>
-          </a:fontRef>
-        </p:style>
-        <p:txBody>
-          <a:bodyPr rtlCol="0" anchor="ctr"/>
-          <a:lstStyle/>
-          <a:p>
-            <a:pPr algn="ctr"/>
-            <a:r>
-              <a:rPr lang="en-US" altLang="zh-CN" b="1" dirty="0">
-                <a:solidFill>
-                  <a:schemeClr val="tx1"/>
-                </a:solidFill>
-                <a:latin typeface="Arial" panose="020B0604020202020204" pitchFamily="34" charset="0"/>
-                <a:cs typeface="Arial" panose="020B0604020202020204" pitchFamily="34" charset="0"/>
-              </a:rPr>
-              <a:t>7</a:t>
-            </a:r>
-            <a:endParaRPr lang="zh-CN" altLang="en-US" b="1" dirty="0">
-              <a:solidFill>
-                <a:schemeClr val="tx1"/>
-              </a:solidFill>
-              <a:latin typeface="Arial" panose="020B0604020202020204" pitchFamily="34" charset="0"/>
-              <a:cs typeface="Arial" panose="020B0604020202020204" pitchFamily="34" charset="0"/>
-            </a:endParaRPr>
-          </a:p>
-        </p:txBody>
-      </p:sp>
-      <p:cxnSp>
-        <p:nvCxnSpPr>
-          <p:cNvPr id="37" name="直接箭头连接符 36">
-            <a:extLst>
-              <a:ext uri="{FF2B5EF4-FFF2-40B4-BE49-F238E27FC236}">
-                <a16:creationId xmlns:a16="http://schemas.microsoft.com/office/drawing/2014/main" id="{85FF7EAC-4345-4162-864A-07839F9B249A}"/>
-              </a:ext>
-            </a:extLst>
-          </p:cNvPr>
-          <p:cNvCxnSpPr>
-            <a:cxnSpLocks/>
-            <a:stCxn id="8" idx="2"/>
-            <a:endCxn id="23" idx="0"/>
-          </p:cNvCxnSpPr>
-          <p:nvPr/>
-        </p:nvCxnSpPr>
-        <p:spPr>
-          <a:xfrm>
-            <a:off x="8887075" y="5183892"/>
-            <a:ext cx="1301875" cy="800777"/>
-          </a:xfrm>
-          <a:prstGeom prst="straightConnector1">
-            <a:avLst/>
-          </a:prstGeom>
-          <a:ln w="44450">
-            <a:solidFill>
-              <a:schemeClr val="accent1"/>
-            </a:solidFill>
-            <a:prstDash val="sysDot"/>
-            <a:tailEnd type="triangle"/>
-          </a:ln>
-        </p:spPr>
-        <p:style>
-          <a:lnRef idx="1">
-            <a:schemeClr val="dk1"/>
-          </a:lnRef>
-          <a:fillRef idx="0">
-            <a:schemeClr val="dk1"/>
-          </a:fillRef>
-          <a:effectRef idx="0">
-            <a:schemeClr val="dk1"/>
-          </a:effectRef>
-          <a:fontRef idx="minor">
-            <a:schemeClr val="tx1"/>
-          </a:fontRef>
-        </p:style>
-      </p:cxnSp>
-      <p:cxnSp>
-        <p:nvCxnSpPr>
-          <p:cNvPr id="40" name="直接箭头连接符 39">
-            <a:extLst>
-              <a:ext uri="{FF2B5EF4-FFF2-40B4-BE49-F238E27FC236}">
-                <a16:creationId xmlns:a16="http://schemas.microsoft.com/office/drawing/2014/main" id="{977FAEEB-D91D-4FB9-94F6-5495459283ED}"/>
-              </a:ext>
-            </a:extLst>
-          </p:cNvPr>
-          <p:cNvCxnSpPr>
-            <a:cxnSpLocks/>
-            <a:stCxn id="22" idx="2"/>
-            <a:endCxn id="23" idx="0"/>
-          </p:cNvCxnSpPr>
-          <p:nvPr/>
-        </p:nvCxnSpPr>
-        <p:spPr>
-          <a:xfrm flipH="1">
-            <a:off x="10188950" y="5217073"/>
-            <a:ext cx="1178795" cy="767596"/>
-          </a:xfrm>
-          <a:prstGeom prst="straightConnector1">
-            <a:avLst/>
-          </a:prstGeom>
-          <a:ln w="44450">
-            <a:solidFill>
-              <a:schemeClr val="accent1"/>
-            </a:solidFill>
-            <a:prstDash val="sysDot"/>
-            <a:tailEnd type="triangle"/>
-          </a:ln>
-        </p:spPr>
-        <p:style>
-          <a:lnRef idx="1">
-            <a:schemeClr val="dk1"/>
-          </a:lnRef>
-          <a:fillRef idx="0">
-            <a:schemeClr val="dk1"/>
-          </a:fillRef>
-          <a:effectRef idx="0">
-            <a:schemeClr val="dk1"/>
-          </a:effectRef>
-          <a:fontRef idx="minor">
-            <a:schemeClr val="tx1"/>
-          </a:fontRef>
-        </p:style>
-      </p:cxnSp>
-      <p:cxnSp>
-        <p:nvCxnSpPr>
-          <p:cNvPr id="43" name="直接箭头连接符 42">
-            <a:extLst>
-              <a:ext uri="{FF2B5EF4-FFF2-40B4-BE49-F238E27FC236}">
-                <a16:creationId xmlns:a16="http://schemas.microsoft.com/office/drawing/2014/main" id="{BBBE7C4D-2784-46E8-8D64-0980613A8533}"/>
-              </a:ext>
-            </a:extLst>
-          </p:cNvPr>
-          <p:cNvCxnSpPr>
-            <a:cxnSpLocks/>
-            <a:stCxn id="21" idx="2"/>
-            <a:endCxn id="23" idx="0"/>
-          </p:cNvCxnSpPr>
-          <p:nvPr/>
-        </p:nvCxnSpPr>
-        <p:spPr>
-          <a:xfrm flipH="1">
-            <a:off x="10188950" y="5217073"/>
-            <a:ext cx="40351" cy="767596"/>
-          </a:xfrm>
-          <a:prstGeom prst="straightConnector1">
-            <a:avLst/>
-          </a:prstGeom>
-          <a:ln w="44450">
-            <a:solidFill>
-              <a:schemeClr val="accent1"/>
-            </a:solidFill>
-            <a:prstDash val="sysDot"/>
-            <a:tailEnd type="triangle"/>
-          </a:ln>
-        </p:spPr>
-        <p:style>
-          <a:lnRef idx="1">
-            <a:schemeClr val="dk1"/>
-          </a:lnRef>
-          <a:fillRef idx="0">
-            <a:schemeClr val="dk1"/>
-          </a:fillRef>
-          <a:effectRef idx="0">
-            <a:schemeClr val="dk1"/>
-          </a:effectRef>
-          <a:fontRef idx="minor">
-            <a:schemeClr val="tx1"/>
-          </a:fontRef>
-        </p:style>
-      </p:cxnSp>
-      <p:sp>
-        <p:nvSpPr>
-          <p:cNvPr id="46" name="矩形 45">
-            <a:extLst>
-              <a:ext uri="{FF2B5EF4-FFF2-40B4-BE49-F238E27FC236}">
-                <a16:creationId xmlns:a16="http://schemas.microsoft.com/office/drawing/2014/main" id="{07463793-DC08-4949-9BCB-AFB460B23A1F}"/>
-              </a:ext>
-            </a:extLst>
-          </p:cNvPr>
-          <p:cNvSpPr/>
-          <p:nvPr/>
-        </p:nvSpPr>
-        <p:spPr>
-          <a:xfrm>
-            <a:off x="9047857" y="5383502"/>
-            <a:ext cx="312907" cy="369332"/>
-          </a:xfrm>
-          <a:prstGeom prst="rect">
-            <a:avLst/>
-          </a:prstGeom>
-        </p:spPr>
-        <p:txBody>
-          <a:bodyPr wrap="square">
-            <a:spAutoFit/>
-          </a:bodyPr>
-          <a:lstStyle/>
-          <a:p>
-            <a:pPr algn="ctr"/>
-            <a:r>
-              <a:rPr lang="en-US" altLang="zh-CN" b="1" dirty="0">
-                <a:solidFill>
-                  <a:schemeClr val="accent1"/>
-                </a:solidFill>
-                <a:latin typeface="Arial" panose="020B0604020202020204" pitchFamily="34" charset="0"/>
-                <a:cs typeface="Arial" panose="020B0604020202020204" pitchFamily="34" charset="0"/>
-              </a:rPr>
-              <a:t>1</a:t>
-            </a:r>
-            <a:endParaRPr lang="zh-CN" altLang="en-US" b="1" dirty="0">
-              <a:solidFill>
-                <a:schemeClr val="accent1"/>
-              </a:solidFill>
-              <a:latin typeface="Arial" panose="020B0604020202020204" pitchFamily="34" charset="0"/>
-              <a:cs typeface="Arial" panose="020B0604020202020204" pitchFamily="34" charset="0"/>
-            </a:endParaRPr>
-          </a:p>
-        </p:txBody>
-      </p:sp>
-      <p:sp>
-        <p:nvSpPr>
-          <p:cNvPr id="47" name="矩形 46">
-            <a:extLst>
-              <a:ext uri="{FF2B5EF4-FFF2-40B4-BE49-F238E27FC236}">
-                <a16:creationId xmlns:a16="http://schemas.microsoft.com/office/drawing/2014/main" id="{A08B1610-7D39-4190-9FBD-8667AC6CC43A}"/>
-              </a:ext>
-            </a:extLst>
-          </p:cNvPr>
-          <p:cNvSpPr/>
-          <p:nvPr/>
-        </p:nvSpPr>
-        <p:spPr>
-          <a:xfrm>
-            <a:off x="9890211" y="5411383"/>
-            <a:ext cx="312907" cy="369332"/>
-          </a:xfrm>
-          <a:prstGeom prst="rect">
-            <a:avLst/>
-          </a:prstGeom>
-        </p:spPr>
-        <p:txBody>
-          <a:bodyPr wrap="none">
-            <a:spAutoFit/>
-          </a:bodyPr>
-          <a:lstStyle/>
-          <a:p>
-            <a:pPr algn="ctr"/>
-            <a:r>
-              <a:rPr lang="en-US" altLang="zh-CN" b="1" dirty="0">
-                <a:solidFill>
-                  <a:schemeClr val="accent1"/>
-                </a:solidFill>
-                <a:latin typeface="Arial" panose="020B0604020202020204" pitchFamily="34" charset="0"/>
-                <a:cs typeface="Arial" panose="020B0604020202020204" pitchFamily="34" charset="0"/>
-              </a:rPr>
-              <a:t>1</a:t>
-            </a:r>
-            <a:endParaRPr lang="zh-CN" altLang="en-US" b="1" dirty="0">
-              <a:solidFill>
-                <a:schemeClr val="accent1"/>
-              </a:solidFill>
-              <a:latin typeface="Arial" panose="020B0604020202020204" pitchFamily="34" charset="0"/>
-              <a:cs typeface="Arial" panose="020B0604020202020204" pitchFamily="34" charset="0"/>
-            </a:endParaRPr>
-          </a:p>
-        </p:txBody>
-      </p:sp>
-      <p:sp>
-        <p:nvSpPr>
-          <p:cNvPr id="48" name="矩形 47">
-            <a:extLst>
-              <a:ext uri="{FF2B5EF4-FFF2-40B4-BE49-F238E27FC236}">
-                <a16:creationId xmlns:a16="http://schemas.microsoft.com/office/drawing/2014/main" id="{99EF1B13-F799-4AF3-9129-C44A22E46D3A}"/>
-              </a:ext>
-            </a:extLst>
-          </p:cNvPr>
-          <p:cNvSpPr/>
-          <p:nvPr/>
-        </p:nvSpPr>
-        <p:spPr>
-          <a:xfrm>
-            <a:off x="11035632" y="5478306"/>
-            <a:ext cx="312907" cy="369332"/>
-          </a:xfrm>
-          <a:prstGeom prst="rect">
-            <a:avLst/>
-          </a:prstGeom>
-        </p:spPr>
-        <p:txBody>
-          <a:bodyPr wrap="none">
-            <a:spAutoFit/>
-          </a:bodyPr>
-          <a:lstStyle/>
-          <a:p>
-            <a:pPr algn="ctr"/>
-            <a:r>
-              <a:rPr lang="en-US" altLang="zh-CN" b="1" dirty="0">
-                <a:solidFill>
-                  <a:schemeClr val="accent1"/>
-                </a:solidFill>
-                <a:latin typeface="Arial" panose="020B0604020202020204" pitchFamily="34" charset="0"/>
-                <a:cs typeface="Arial" panose="020B0604020202020204" pitchFamily="34" charset="0"/>
-              </a:rPr>
-              <a:t>1</a:t>
-            </a:r>
-            <a:endParaRPr lang="zh-CN" altLang="en-US" b="1" dirty="0">
-              <a:solidFill>
-                <a:schemeClr val="accent1"/>
-              </a:solidFill>
-              <a:latin typeface="Arial" panose="020B0604020202020204" pitchFamily="34" charset="0"/>
-              <a:cs typeface="Arial" panose="020B0604020202020204" pitchFamily="34" charset="0"/>
-            </a:endParaRPr>
-          </a:p>
-        </p:txBody>
-      </p:sp>
-      <p:cxnSp>
-        <p:nvCxnSpPr>
-          <p:cNvPr id="60" name="直接箭头连接符 59">
-            <a:extLst>
-              <a:ext uri="{FF2B5EF4-FFF2-40B4-BE49-F238E27FC236}">
-                <a16:creationId xmlns:a16="http://schemas.microsoft.com/office/drawing/2014/main" id="{C63BB01E-DB2E-42F1-BBA1-06643BCEF725}"/>
-              </a:ext>
-            </a:extLst>
-          </p:cNvPr>
-          <p:cNvCxnSpPr>
-            <a:cxnSpLocks/>
-            <a:stCxn id="7" idx="2"/>
-            <a:endCxn id="8" idx="0"/>
-          </p:cNvCxnSpPr>
-          <p:nvPr/>
-        </p:nvCxnSpPr>
-        <p:spPr>
-          <a:xfrm flipH="1">
-            <a:off x="8887075" y="3989494"/>
-            <a:ext cx="19561" cy="805778"/>
-          </a:xfrm>
-          <a:prstGeom prst="straightConnector1">
-            <a:avLst/>
-          </a:prstGeom>
-          <a:ln w="44450">
-            <a:solidFill>
-              <a:srgbClr val="0000CC"/>
-            </a:solidFill>
-            <a:prstDash val="sysDash"/>
-            <a:tailEnd type="triangle"/>
-          </a:ln>
-        </p:spPr>
-        <p:style>
-          <a:lnRef idx="1">
-            <a:schemeClr val="dk1"/>
-          </a:lnRef>
-          <a:fillRef idx="0">
-            <a:schemeClr val="dk1"/>
-          </a:fillRef>
-          <a:effectRef idx="0">
-            <a:schemeClr val="dk1"/>
-          </a:effectRef>
-          <a:fontRef idx="minor">
-            <a:schemeClr val="tx1"/>
-          </a:fontRef>
-        </p:style>
-      </p:cxnSp>
-      <p:sp>
-        <p:nvSpPr>
-          <p:cNvPr id="63" name="矩形 62">
-            <a:extLst>
-              <a:ext uri="{FF2B5EF4-FFF2-40B4-BE49-F238E27FC236}">
-                <a16:creationId xmlns:a16="http://schemas.microsoft.com/office/drawing/2014/main" id="{9E635C6B-CAD1-4E9F-B301-8ED99689E95A}"/>
-              </a:ext>
-            </a:extLst>
-          </p:cNvPr>
-          <p:cNvSpPr/>
-          <p:nvPr/>
-        </p:nvSpPr>
-        <p:spPr>
-          <a:xfrm>
-            <a:off x="8596773" y="4050126"/>
-            <a:ext cx="300082" cy="369332"/>
-          </a:xfrm>
-          <a:prstGeom prst="rect">
-            <a:avLst/>
-          </a:prstGeom>
-        </p:spPr>
-        <p:txBody>
-          <a:bodyPr wrap="none">
-            <a:spAutoFit/>
-          </a:bodyPr>
-          <a:lstStyle/>
-          <a:p>
-            <a:pPr algn="ctr"/>
-            <a:r>
-              <a:rPr lang="en-US" altLang="zh-CN" b="1" dirty="0">
-                <a:solidFill>
-                  <a:srgbClr val="0000CC"/>
-                </a:solidFill>
-                <a:latin typeface="Times New Roman" panose="02020603050405020304" pitchFamily="18" charset="0"/>
-                <a:cs typeface="Times New Roman" panose="02020603050405020304" pitchFamily="18" charset="0"/>
-              </a:rPr>
-              <a:t>4</a:t>
-            </a:r>
-            <a:endParaRPr lang="zh-CN" altLang="en-US" b="1" dirty="0">
-              <a:solidFill>
-                <a:srgbClr val="0000CC"/>
-              </a:solidFill>
-              <a:latin typeface="Times New Roman" panose="02020603050405020304" pitchFamily="18" charset="0"/>
-              <a:cs typeface="Times New Roman" panose="02020603050405020304" pitchFamily="18" charset="0"/>
-            </a:endParaRPr>
-          </a:p>
-        </p:txBody>
-      </p:sp>
-      <p:cxnSp>
-        <p:nvCxnSpPr>
-          <p:cNvPr id="66" name="直接箭头连接符 65">
-            <a:extLst>
-              <a:ext uri="{FF2B5EF4-FFF2-40B4-BE49-F238E27FC236}">
-                <a16:creationId xmlns:a16="http://schemas.microsoft.com/office/drawing/2014/main" id="{12960518-2FEC-4A6A-A1B1-D7B25CE3494C}"/>
-              </a:ext>
-            </a:extLst>
-          </p:cNvPr>
-          <p:cNvCxnSpPr>
-            <a:cxnSpLocks/>
-            <a:stCxn id="6" idx="2"/>
-            <a:endCxn id="21" idx="0"/>
-          </p:cNvCxnSpPr>
-          <p:nvPr/>
-        </p:nvCxnSpPr>
-        <p:spPr>
-          <a:xfrm>
-            <a:off x="9421324" y="3000076"/>
-            <a:ext cx="807977" cy="1828377"/>
-          </a:xfrm>
-          <a:prstGeom prst="straightConnector1">
-            <a:avLst/>
-          </a:prstGeom>
-          <a:ln w="44450">
-            <a:solidFill>
-              <a:srgbClr val="0099CC"/>
-            </a:solidFill>
-            <a:prstDash val="sysDash"/>
-            <a:tailEnd type="triangle"/>
-          </a:ln>
-        </p:spPr>
-        <p:style>
-          <a:lnRef idx="1">
-            <a:schemeClr val="dk1"/>
-          </a:lnRef>
-          <a:fillRef idx="0">
-            <a:schemeClr val="dk1"/>
-          </a:fillRef>
-          <a:effectRef idx="0">
-            <a:schemeClr val="dk1"/>
-          </a:effectRef>
-          <a:fontRef idx="minor">
-            <a:schemeClr val="tx1"/>
-          </a:fontRef>
-        </p:style>
-      </p:cxnSp>
-      <p:sp>
-        <p:nvSpPr>
-          <p:cNvPr id="69" name="矩形 68">
-            <a:extLst>
-              <a:ext uri="{FF2B5EF4-FFF2-40B4-BE49-F238E27FC236}">
-                <a16:creationId xmlns:a16="http://schemas.microsoft.com/office/drawing/2014/main" id="{753EEEB3-6130-4A4A-B4E7-A4144C1B9BC1}"/>
-              </a:ext>
-            </a:extLst>
-          </p:cNvPr>
-          <p:cNvSpPr/>
-          <p:nvPr/>
-        </p:nvSpPr>
-        <p:spPr>
-          <a:xfrm>
-            <a:off x="9828246" y="3548930"/>
-            <a:ext cx="300082" cy="369332"/>
-          </a:xfrm>
-          <a:prstGeom prst="rect">
-            <a:avLst/>
-          </a:prstGeom>
-        </p:spPr>
-        <p:txBody>
-          <a:bodyPr wrap="none">
-            <a:spAutoFit/>
-          </a:bodyPr>
-          <a:lstStyle/>
-          <a:p>
-            <a:pPr algn="ctr"/>
-            <a:r>
-              <a:rPr lang="en-US" altLang="zh-CN" b="1" dirty="0">
-                <a:solidFill>
-                  <a:srgbClr val="0099CC"/>
-                </a:solidFill>
-                <a:latin typeface="Times New Roman" panose="02020603050405020304" pitchFamily="18" charset="0"/>
-                <a:cs typeface="Times New Roman" panose="02020603050405020304" pitchFamily="18" charset="0"/>
-              </a:rPr>
-              <a:t>6</a:t>
-            </a:r>
-            <a:endParaRPr lang="zh-CN" altLang="en-US" b="1" dirty="0">
-              <a:solidFill>
-                <a:srgbClr val="0099CC"/>
-              </a:solidFill>
-              <a:latin typeface="Times New Roman" panose="02020603050405020304" pitchFamily="18" charset="0"/>
-              <a:cs typeface="Times New Roman" panose="02020603050405020304" pitchFamily="18" charset="0"/>
             </a:endParaRPr>
           </a:p>
         </p:txBody>
@@ -14480,6 +13536,255 @@
     <p:extLst>
       <p:ext uri="{BB962C8B-B14F-4D97-AF65-F5344CB8AC3E}">
         <p14:creationId xmlns:p14="http://schemas.microsoft.com/office/powerpoint/2010/main" val="208032218"/>
+      </p:ext>
+    </p:extLst>
+  </p:cSld>
+  <p:clrMapOvr>
+    <a:masterClrMapping/>
+  </p:clrMapOvr>
+</p:sld>
+</file>
+
+<file path=ppt/slides/slide26.xml><?xml version="1.0" encoding="utf-8"?>
+<p:sld xmlns:a="http://schemas.openxmlformats.org/drawingml/2006/main" xmlns:r="http://schemas.openxmlformats.org/officeDocument/2006/relationships" xmlns:p="http://schemas.openxmlformats.org/presentationml/2006/main">
+  <p:cSld>
+    <p:spTree>
+      <p:nvGrpSpPr>
+        <p:cNvPr id="1" name=""/>
+        <p:cNvGrpSpPr/>
+        <p:nvPr/>
+      </p:nvGrpSpPr>
+      <p:grpSpPr>
+        <a:xfrm>
+          <a:off x="0" y="0"/>
+          <a:ext cx="0" cy="0"/>
+          <a:chOff x="0" y="0"/>
+          <a:chExt cx="0" cy="0"/>
+        </a:xfrm>
+      </p:grpSpPr>
+      <p:sp>
+        <p:nvSpPr>
+          <p:cNvPr id="4" name="标题 1">
+            <a:extLst>
+              <a:ext uri="{FF2B5EF4-FFF2-40B4-BE49-F238E27FC236}">
+                <a16:creationId xmlns:a16="http://schemas.microsoft.com/office/drawing/2014/main" id="{D5DEED4E-8A35-4F89-AC2B-45D3FCE01389}"/>
+              </a:ext>
+            </a:extLst>
+          </p:cNvPr>
+          <p:cNvSpPr>
+            <a:spLocks noGrp="1"/>
+          </p:cNvSpPr>
+          <p:nvPr>
+            <p:ph type="title"/>
+          </p:nvPr>
+        </p:nvSpPr>
+        <p:spPr>
+          <a:xfrm>
+            <a:off x="838200" y="2766218"/>
+            <a:ext cx="10515600" cy="1325563"/>
+          </a:xfrm>
+        </p:spPr>
+        <p:txBody>
+          <a:bodyPr>
+            <a:normAutofit/>
+          </a:bodyPr>
+          <a:lstStyle/>
+          <a:p>
+            <a:pPr algn="ctr"/>
+            <a:r>
+              <a:rPr lang="en-US" altLang="zh-CN" sz="5000" dirty="0">
+                <a:latin typeface="Arial" panose="020B0604020202020204" pitchFamily="34" charset="0"/>
+                <a:cs typeface="Arial" panose="020B0604020202020204" pitchFamily="34" charset="0"/>
+              </a:rPr>
+              <a:t>Future Work</a:t>
+            </a:r>
+            <a:endParaRPr lang="zh-CN" altLang="en-US" sz="5000" dirty="0">
+              <a:latin typeface="Arial" panose="020B0604020202020204" pitchFamily="34" charset="0"/>
+              <a:cs typeface="Arial" panose="020B0604020202020204" pitchFamily="34" charset="0"/>
+            </a:endParaRPr>
+          </a:p>
+        </p:txBody>
+      </p:sp>
+    </p:spTree>
+    <p:extLst>
+      <p:ext uri="{BB962C8B-B14F-4D97-AF65-F5344CB8AC3E}">
+        <p14:creationId xmlns:p14="http://schemas.microsoft.com/office/powerpoint/2010/main" val="2740857928"/>
+      </p:ext>
+    </p:extLst>
+  </p:cSld>
+  <p:clrMapOvr>
+    <a:masterClrMapping/>
+  </p:clrMapOvr>
+</p:sld>
+</file>
+
+<file path=ppt/slides/slide27.xml><?xml version="1.0" encoding="utf-8"?>
+<p:sld xmlns:a="http://schemas.openxmlformats.org/drawingml/2006/main" xmlns:r="http://schemas.openxmlformats.org/officeDocument/2006/relationships" xmlns:p="http://schemas.openxmlformats.org/presentationml/2006/main">
+  <p:cSld>
+    <p:spTree>
+      <p:nvGrpSpPr>
+        <p:cNvPr id="1" name=""/>
+        <p:cNvGrpSpPr/>
+        <p:nvPr/>
+      </p:nvGrpSpPr>
+      <p:grpSpPr>
+        <a:xfrm>
+          <a:off x="0" y="0"/>
+          <a:ext cx="0" cy="0"/>
+          <a:chOff x="0" y="0"/>
+          <a:chExt cx="0" cy="0"/>
+        </a:xfrm>
+      </p:grpSpPr>
+      <p:sp>
+        <p:nvSpPr>
+          <p:cNvPr id="4" name="标题 1">
+            <a:extLst>
+              <a:ext uri="{FF2B5EF4-FFF2-40B4-BE49-F238E27FC236}">
+                <a16:creationId xmlns:a16="http://schemas.microsoft.com/office/drawing/2014/main" id="{F741896C-AF7B-49B6-A35A-62086F7FE141}"/>
+              </a:ext>
+            </a:extLst>
+          </p:cNvPr>
+          <p:cNvSpPr>
+            <a:spLocks noGrp="1"/>
+          </p:cNvSpPr>
+          <p:nvPr>
+            <p:ph type="title"/>
+          </p:nvPr>
+        </p:nvSpPr>
+        <p:spPr>
+          <a:xfrm>
+            <a:off x="838200" y="365125"/>
+            <a:ext cx="10515600" cy="1325563"/>
+          </a:xfrm>
+        </p:spPr>
+        <p:txBody>
+          <a:bodyPr>
+            <a:noAutofit/>
+          </a:bodyPr>
+          <a:lstStyle/>
+          <a:p>
+            <a:r>
+              <a:rPr lang="en-US" altLang="zh-CN" dirty="0">
+                <a:latin typeface="Arial" panose="020B0604020202020204" pitchFamily="34" charset="0"/>
+                <a:cs typeface="Arial" panose="020B0604020202020204" pitchFamily="34" charset="0"/>
+              </a:rPr>
+              <a:t>Future Work</a:t>
+            </a:r>
+          </a:p>
+        </p:txBody>
+      </p:sp>
+      <p:sp>
+        <p:nvSpPr>
+          <p:cNvPr id="5" name="文本框 4">
+            <a:extLst>
+              <a:ext uri="{FF2B5EF4-FFF2-40B4-BE49-F238E27FC236}">
+                <a16:creationId xmlns:a16="http://schemas.microsoft.com/office/drawing/2014/main" id="{2A5FCBCF-0ACA-4DE7-A8EE-FDD1509D05DC}"/>
+              </a:ext>
+            </a:extLst>
+          </p:cNvPr>
+          <p:cNvSpPr txBox="1"/>
+          <p:nvPr/>
+        </p:nvSpPr>
+        <p:spPr>
+          <a:xfrm>
+            <a:off x="931178" y="2457974"/>
+            <a:ext cx="9009776" cy="2785378"/>
+          </a:xfrm>
+          <a:prstGeom prst="rect">
+            <a:avLst/>
+          </a:prstGeom>
+          <a:noFill/>
+        </p:spPr>
+        <p:txBody>
+          <a:bodyPr wrap="square" rtlCol="0">
+            <a:spAutoFit/>
+          </a:bodyPr>
+          <a:lstStyle/>
+          <a:p>
+            <a:pPr marL="342900" indent="-342900">
+              <a:buAutoNum type="arabicPeriod"/>
+            </a:pPr>
+            <a:r>
+              <a:rPr lang="en-US" altLang="zh-CN" sz="2500" dirty="0">
+                <a:latin typeface="Arial" panose="020B0604020202020204" pitchFamily="34" charset="0"/>
+                <a:cs typeface="Arial" panose="020B0604020202020204" pitchFamily="34" charset="0"/>
+              </a:rPr>
+              <a:t>Weight Sharing of Neural Networks</a:t>
+            </a:r>
+          </a:p>
+          <a:p>
+            <a:pPr marL="342900" indent="-342900">
+              <a:buAutoNum type="arabicPeriod"/>
+            </a:pPr>
+            <a:endParaRPr lang="en-US" altLang="zh-CN" sz="2500" dirty="0">
+              <a:latin typeface="Arial" panose="020B0604020202020204" pitchFamily="34" charset="0"/>
+              <a:cs typeface="Arial" panose="020B0604020202020204" pitchFamily="34" charset="0"/>
+            </a:endParaRPr>
+          </a:p>
+          <a:p>
+            <a:pPr marL="342900" indent="-342900">
+              <a:buAutoNum type="arabicPeriod"/>
+            </a:pPr>
+            <a:r>
+              <a:rPr lang="en-US" altLang="zh-CN" sz="2500" dirty="0">
+                <a:latin typeface="Arial" panose="020B0604020202020204" pitchFamily="34" charset="0"/>
+                <a:cs typeface="Arial" panose="020B0604020202020204" pitchFamily="34" charset="0"/>
+              </a:rPr>
+              <a:t>Heuristic Mutation Operation</a:t>
+            </a:r>
+          </a:p>
+          <a:p>
+            <a:pPr marL="342900" indent="-342900">
+              <a:buAutoNum type="arabicPeriod"/>
+            </a:pPr>
+            <a:endParaRPr lang="en-US" altLang="zh-CN" sz="2500" dirty="0">
+              <a:latin typeface="Arial" panose="020B0604020202020204" pitchFamily="34" charset="0"/>
+              <a:cs typeface="Arial" panose="020B0604020202020204" pitchFamily="34" charset="0"/>
+            </a:endParaRPr>
+          </a:p>
+          <a:p>
+            <a:pPr marL="342900" indent="-342900">
+              <a:buAutoNum type="arabicPeriod"/>
+            </a:pPr>
+            <a:r>
+              <a:rPr lang="en-US" altLang="zh-CN" sz="2500" dirty="0">
+                <a:latin typeface="Arial" panose="020B0604020202020204" pitchFamily="34" charset="0"/>
+                <a:cs typeface="Arial" panose="020B0604020202020204" pitchFamily="34" charset="0"/>
+              </a:rPr>
+              <a:t>More Efficient Performance Estimation</a:t>
+            </a:r>
+          </a:p>
+          <a:p>
+            <a:pPr marL="342900" indent="-342900">
+              <a:buAutoNum type="arabicPeriod"/>
+            </a:pPr>
+            <a:endParaRPr lang="en-US" altLang="zh-CN" sz="2500" dirty="0">
+              <a:latin typeface="Arial" panose="020B0604020202020204" pitchFamily="34" charset="0"/>
+              <a:cs typeface="Arial" panose="020B0604020202020204" pitchFamily="34" charset="0"/>
+            </a:endParaRPr>
+          </a:p>
+          <a:p>
+            <a:pPr marL="342900" indent="-342900">
+              <a:buAutoNum type="arabicPeriod"/>
+            </a:pPr>
+            <a:r>
+              <a:rPr lang="en-US" altLang="zh-CN" sz="2500" dirty="0">
+                <a:latin typeface="Arial" panose="020B0604020202020204" pitchFamily="34" charset="0"/>
+                <a:cs typeface="Arial" panose="020B0604020202020204" pitchFamily="34" charset="0"/>
+              </a:rPr>
+              <a:t>Find Proper Size of a Cell</a:t>
+            </a:r>
+            <a:endParaRPr lang="zh-CN" altLang="en-US" sz="2500" dirty="0">
+              <a:latin typeface="Arial" panose="020B0604020202020204" pitchFamily="34" charset="0"/>
+              <a:cs typeface="Arial" panose="020B0604020202020204" pitchFamily="34" charset="0"/>
+            </a:endParaRPr>
+          </a:p>
+        </p:txBody>
+      </p:sp>
+    </p:spTree>
+    <p:extLst>
+      <p:ext uri="{BB962C8B-B14F-4D97-AF65-F5344CB8AC3E}">
+        <p14:creationId xmlns:p14="http://schemas.microsoft.com/office/powerpoint/2010/main" val="3516523388"/>
       </p:ext>
     </p:extLst>
   </p:cSld>

</xml_diff>